<commit_message>
updated slides with ANGLE content
</commit_message>
<xml_diff>
--- a/Presentation.pptx
+++ b/Presentation.pptx
@@ -1447,7 +1447,7 @@
           <a:p>
             <a:fld id="{90EC29EE-A8AD-4CE0-9C0B-116E0D4D7533}" type="datetime8">
               <a:rPr lang="en-US" smtClean="0"/>
-              <a:t>3/18/2016 11:02 AM</a:t>
+              <a:t>3/18/2016 12:34 PM</a:t>
             </a:fld>
             <a:endParaRPr lang="en-US" dirty="0"/>
           </a:p>
@@ -19322,12 +19322,48 @@
           <a:lstStyle/>
           <a:p>
             <a:r>
+              <a:rPr lang="en-US" b="1" dirty="0" smtClean="0"/>
+              <a:t>A</a:t>
+            </a:r>
+            <a:r>
               <a:rPr lang="en-US" dirty="0" smtClean="0"/>
-              <a:t>Alm</a:t>
+              <a:t>lm</a:t>
             </a:r>
             <a:r>
               <a:rPr lang="en-US" dirty="0" smtClean="0"/>
-              <a:t>ost Native Graphics Layer Engine</a:t>
+              <a:t>ost </a:t>
+            </a:r>
+            <a:r>
+              <a:rPr lang="en-US" b="1" dirty="0" smtClean="0"/>
+              <a:t>N</a:t>
+            </a:r>
+            <a:r>
+              <a:rPr lang="en-US" dirty="0" smtClean="0"/>
+              <a:t>ative </a:t>
+            </a:r>
+            <a:r>
+              <a:rPr lang="en-US" b="1" dirty="0" smtClean="0"/>
+              <a:t>G</a:t>
+            </a:r>
+            <a:r>
+              <a:rPr lang="en-US" dirty="0" smtClean="0"/>
+              <a:t>raphics </a:t>
+            </a:r>
+            <a:r>
+              <a:rPr lang="en-US" b="1" dirty="0" smtClean="0"/>
+              <a:t>L</a:t>
+            </a:r>
+            <a:r>
+              <a:rPr lang="en-US" dirty="0" smtClean="0"/>
+              <a:t>ayer </a:t>
+            </a:r>
+            <a:r>
+              <a:rPr lang="en-US" b="1" dirty="0" smtClean="0"/>
+              <a:t>E</a:t>
+            </a:r>
+            <a:r>
+              <a:rPr lang="en-US" dirty="0" smtClean="0"/>
+              <a:t>ngine</a:t>
             </a:r>
             <a:endParaRPr lang="en-US" dirty="0" smtClean="0"/>
           </a:p>
@@ -24103,7 +24139,7 @@
         <p:spPr>
           <a:xfrm>
             <a:off x="274638" y="1212850"/>
-            <a:ext cx="11887200" cy="3508653"/>
+            <a:ext cx="11887200" cy="5139869"/>
           </a:xfrm>
         </p:spPr>
         <p:txBody>
@@ -24147,6 +24183,21 @@
             </a:r>
           </a:p>
           <a:p>
+            <a:endParaRPr lang="en-US" sz="2000" dirty="0" smtClean="0"/>
+          </a:p>
+          <a:p>
+            <a:pPr lvl="1"/>
+            <a:r>
+              <a:rPr lang="en-US" dirty="0"/>
+              <a:t>ANGLE </a:t>
+            </a:r>
+            <a:r>
+              <a:rPr lang="en-US" dirty="0" smtClean="0"/>
+              <a:t>provides templates for Visual Studio 2013 and 2015 that work as starting points for porting your game.</a:t>
+            </a:r>
+            <a:endParaRPr lang="en-US" dirty="0"/>
+          </a:p>
+          <a:p>
             <a:endParaRPr lang="en-US" sz="2000" dirty="0"/>
           </a:p>
           <a:p>
@@ -24185,8 +24236,34 @@
             </a:r>
             <a:r>
               <a:rPr lang="en-US" dirty="0"/>
-              <a:t> APIs.</a:t>
-            </a:r>
+              <a:t> APIs</a:t>
+            </a:r>
+            <a:r>
+              <a:rPr lang="en-US" dirty="0" smtClean="0"/>
+              <a:t>.</a:t>
+            </a:r>
+          </a:p>
+          <a:p>
+            <a:pPr lvl="1"/>
+            <a:endParaRPr lang="en-US" dirty="0"/>
+          </a:p>
+          <a:p>
+            <a:pPr lvl="1"/>
+            <a:r>
+              <a:rPr lang="en-US" dirty="0" smtClean="0"/>
+              <a:t>Known </a:t>
+            </a:r>
+            <a:r>
+              <a:rPr lang="en-US" dirty="0"/>
+              <a:t>Issues: </a:t>
+            </a:r>
+            <a:r>
+              <a:rPr lang="en-US" dirty="0">
+                <a:hlinkClick r:id="rId5"/>
+              </a:rPr>
+              <a:t>https://github.com/MSOpenTech/angle/wiki/Known-Issues</a:t>
+            </a:r>
+            <a:endParaRPr lang="en-US" dirty="0"/>
           </a:p>
           <a:p>
             <a:pPr lvl="1"/>

</xml_diff>

<commit_message>
added related session slide
</commit_message>
<xml_diff>
--- a/Presentation.pptx
+++ b/Presentation.pptx
@@ -6,10 +6,10 @@
     <p:sldMasterId id="2147484310" r:id="rId5"/>
   </p:sldMasterIdLst>
   <p:notesMasterIdLst>
-    <p:notesMasterId r:id="rId21"/>
+    <p:notesMasterId r:id="rId22"/>
   </p:notesMasterIdLst>
   <p:handoutMasterIdLst>
-    <p:handoutMasterId r:id="rId22"/>
+    <p:handoutMasterId r:id="rId23"/>
   </p:handoutMasterIdLst>
   <p:sldIdLst>
     <p:sldId id="1444" r:id="rId6"/>
@@ -23,10 +23,11 @@
     <p:sldId id="1459" r:id="rId14"/>
     <p:sldId id="1460" r:id="rId15"/>
     <p:sldId id="1462" r:id="rId16"/>
-    <p:sldId id="1465" r:id="rId17"/>
-    <p:sldId id="1463" r:id="rId18"/>
-    <p:sldId id="1464" r:id="rId19"/>
-    <p:sldId id="1466" r:id="rId20"/>
+    <p:sldId id="1469" r:id="rId17"/>
+    <p:sldId id="1465" r:id="rId18"/>
+    <p:sldId id="1463" r:id="rId19"/>
+    <p:sldId id="1464" r:id="rId20"/>
+    <p:sldId id="1466" r:id="rId21"/>
   </p:sldIdLst>
   <p:sldSz cx="12436475" cy="6994525"/>
   <p:notesSz cx="6858000" cy="9144000"/>
@@ -260,7 +261,7 @@
               <a:rPr lang="en-US" smtClean="0">
                 <a:latin typeface="Segoe UI" pitchFamily="34" charset="0"/>
               </a:rPr>
-              <a:t>3/21/2016 10:15 AM</a:t>
+              <a:t>3/23/2016 8:30 AM</a:t>
             </a:fld>
             <a:endParaRPr lang="en-US" dirty="0">
               <a:latin typeface="Segoe UI" pitchFamily="34" charset="0"/>
@@ -558,7 +559,7 @@
           <a:p>
             <a:fld id="{38EEC551-8CDA-4EB6-89BB-2A86C9F091C8}" type="datetime8">
               <a:rPr lang="en-US" smtClean="0"/>
-              <a:t>3/21/2016 10:15 AM</a:t>
+              <a:t>3/23/2016 8:30 AM</a:t>
             </a:fld>
             <a:endParaRPr lang="en-US" dirty="0"/>
           </a:p>
@@ -946,7 +947,7 @@
           <a:p>
             <a:fld id="{38EEC551-8CDA-4EB6-89BB-2A86C9F091C8}" type="datetime8">
               <a:rPr lang="en-US" smtClean="0"/>
-              <a:t>3/21/2016 10:15 AM</a:t>
+              <a:t>3/23/2016 8:30 AM</a:t>
             </a:fld>
             <a:endParaRPr lang="en-US" dirty="0"/>
           </a:p>
@@ -1156,7 +1157,7 @@
           <a:p>
             <a:fld id="{E74353ED-ACB2-44BF-A903-985B0AF962B7}" type="datetime1">
               <a:rPr lang="en-US" smtClean="0"/>
-              <a:t>3/21/2016</a:t>
+              <a:t>3/23/2016</a:t>
             </a:fld>
             <a:endParaRPr lang="en-US" dirty="0"/>
           </a:p>
@@ -1180,7 +1181,7 @@
             <a:fld id="{B4008EB6-D09E-4580-8CD6-DDB14511944F}" type="slidenum">
               <a:rPr lang="en-US" smtClean="0"/>
               <a:pPr/>
-              <a:t>14</a:t>
+              <a:t>15</a:t>
             </a:fld>
             <a:endParaRPr lang="en-US" dirty="0"/>
           </a:p>
@@ -1340,7 +1341,7 @@
           <a:p>
             <a:fld id="{38EEC551-8CDA-4EB6-89BB-2A86C9F091C8}" type="datetime8">
               <a:rPr lang="en-US" smtClean="0"/>
-              <a:t>3/21/2016 10:15 AM</a:t>
+              <a:t>3/23/2016 8:30 AM</a:t>
             </a:fld>
             <a:endParaRPr lang="en-US" dirty="0"/>
           </a:p>
@@ -1364,7 +1365,7 @@
             <a:fld id="{B4008EB6-D09E-4580-8CD6-DDB14511944F}" type="slidenum">
               <a:rPr lang="en-US" smtClean="0"/>
               <a:pPr/>
-              <a:t>15</a:t>
+              <a:t>16</a:t>
             </a:fld>
             <a:endParaRPr lang="en-US" dirty="0"/>
           </a:p>
@@ -1546,7 +1547,7 @@
                 </a:solidFill>
               </a:rPr>
               <a:pPr/>
-              <a:t>3/21/2016 10:24 AM</a:t>
+              <a:t>3/23/2016 8:30 AM</a:t>
             </a:fld>
             <a:endParaRPr lang="en-US" dirty="0">
               <a:solidFill>
@@ -1723,7 +1724,7 @@
           <a:p>
             <a:fld id="{90EC29EE-A8AD-4CE0-9C0B-116E0D4D7533}" type="datetime8">
               <a:rPr lang="en-US" smtClean="0"/>
-              <a:t>3/21/2016 10:23 AM</a:t>
+              <a:t>3/23/2016 8:30 AM</a:t>
             </a:fld>
             <a:endParaRPr lang="en-US" dirty="0"/>
           </a:p>
@@ -1921,7 +1922,7 @@
                 </a:solidFill>
               </a:rPr>
               <a:pPr/>
-              <a:t>3/21/2016 10:16 AM</a:t>
+              <a:t>3/23/2016 8:30 AM</a:t>
             </a:fld>
             <a:endParaRPr lang="en-US" dirty="0">
               <a:solidFill>
@@ -2271,7 +2272,7 @@
           <a:p>
             <a:fld id="{90EC29EE-A8AD-4CE0-9C0B-116E0D4D7533}" type="datetime8">
               <a:rPr lang="en-US" smtClean="0"/>
-              <a:t>3/21/2016 10:15 AM</a:t>
+              <a:t>3/23/2016 8:30 AM</a:t>
             </a:fld>
             <a:endParaRPr lang="en-US" dirty="0"/>
           </a:p>
@@ -2625,7 +2626,7 @@
           <a:p>
             <a:fld id="{38EEC551-8CDA-4EB6-89BB-2A86C9F091C8}" type="datetime8">
               <a:rPr lang="en-US" smtClean="0"/>
-              <a:t>3/21/2016 10:15 AM</a:t>
+              <a:t>3/23/2016 8:30 AM</a:t>
             </a:fld>
             <a:endParaRPr lang="en-US" dirty="0"/>
           </a:p>
@@ -2782,7 +2783,7 @@
           <a:p>
             <a:fld id="{E74353ED-ACB2-44BF-A903-985B0AF962B7}" type="datetime1">
               <a:rPr lang="en-US" smtClean="0"/>
-              <a:t>3/21/2016</a:t>
+              <a:t>3/23/2016</a:t>
             </a:fld>
             <a:endParaRPr lang="en-US" dirty="0"/>
           </a:p>
@@ -2806,7 +2807,7 @@
             <a:fld id="{B4008EB6-D09E-4580-8CD6-DDB14511944F}" type="slidenum">
               <a:rPr lang="en-US" smtClean="0"/>
               <a:pPr/>
-              <a:t>13</a:t>
+              <a:t>14</a:t>
             </a:fld>
             <a:endParaRPr lang="en-US" dirty="0"/>
           </a:p>
@@ -18911,6 +18912,130 @@
       </p:grpSpPr>
       <p:sp>
         <p:nvSpPr>
+          <p:cNvPr id="5" name="Title 4"/>
+          <p:cNvSpPr>
+            <a:spLocks noGrp="1"/>
+          </p:cNvSpPr>
+          <p:nvPr>
+            <p:ph type="title"/>
+          </p:nvPr>
+        </p:nvSpPr>
+        <p:spPr/>
+        <p:txBody>
+          <a:bodyPr/>
+          <a:lstStyle/>
+          <a:p>
+            <a:r>
+              <a:rPr lang="en-US" dirty="0" smtClean="0"/>
+              <a:t>Related session</a:t>
+            </a:r>
+            <a:endParaRPr lang="en-US" dirty="0"/>
+          </a:p>
+        </p:txBody>
+      </p:sp>
+      <p:sp>
+        <p:nvSpPr>
+          <p:cNvPr id="6" name="Text Placeholder 5"/>
+          <p:cNvSpPr>
+            <a:spLocks noGrp="1"/>
+          </p:cNvSpPr>
+          <p:nvPr>
+            <p:ph type="body" sz="quarter" idx="10"/>
+          </p:nvPr>
+        </p:nvSpPr>
+        <p:spPr>
+          <a:xfrm>
+            <a:off x="277003" y="1897062"/>
+            <a:ext cx="11887200" cy="1754326"/>
+          </a:xfrm>
+        </p:spPr>
+        <p:txBody>
+          <a:bodyPr anchor="ctr" anchorCtr="0"/>
+          <a:lstStyle/>
+          <a:p>
+            <a:r>
+              <a:rPr lang="en-US" dirty="0" smtClean="0"/>
+              <a:t>The Future of Game Development on Windows</a:t>
+            </a:r>
+          </a:p>
+          <a:p>
+            <a:pPr lvl="1"/>
+            <a:r>
+              <a:rPr lang="en-US" b="1" dirty="0" smtClean="0"/>
+              <a:t>Date:</a:t>
+            </a:r>
+            <a:r>
+              <a:rPr lang="en-US" dirty="0" smtClean="0"/>
+              <a:t> 	Wednesday, March 30</a:t>
+            </a:r>
+          </a:p>
+          <a:p>
+            <a:pPr lvl="1"/>
+            <a:r>
+              <a:rPr lang="en-US" b="1" dirty="0" smtClean="0"/>
+              <a:t>Time:</a:t>
+            </a:r>
+            <a:r>
+              <a:rPr lang="en-US" dirty="0" smtClean="0"/>
+              <a:t> 	5:00pm – 6:00pm</a:t>
+            </a:r>
+          </a:p>
+          <a:p>
+            <a:pPr lvl="1"/>
+            <a:r>
+              <a:rPr lang="en-US" b="1" dirty="0" smtClean="0"/>
+              <a:t>Room: 	</a:t>
+            </a:r>
+            <a:r>
+              <a:rPr lang="en-US" dirty="0" smtClean="0"/>
+              <a:t>Marriott 6</a:t>
+            </a:r>
+            <a:endParaRPr lang="en-US" dirty="0"/>
+          </a:p>
+        </p:txBody>
+      </p:sp>
+    </p:spTree>
+    <p:extLst>
+      <p:ext uri="{BB962C8B-B14F-4D97-AF65-F5344CB8AC3E}">
+        <p14:creationId xmlns:p14="http://schemas.microsoft.com/office/powerpoint/2010/main" val="3456915216"/>
+      </p:ext>
+    </p:extLst>
+  </p:cSld>
+  <p:clrMapOvr>
+    <a:masterClrMapping/>
+  </p:clrMapOvr>
+  <p:transition>
+    <p:fade/>
+  </p:transition>
+  <p:timing>
+    <p:tnLst>
+      <p:par>
+        <p:cTn id="1" dur="indefinite" restart="never" nodeType="tmRoot"/>
+      </p:par>
+    </p:tnLst>
+  </p:timing>
+</p:sld>
+</file>
+
+<file path=ppt/slides/slide13.xml><?xml version="1.0" encoding="utf-8"?>
+<p:sld xmlns:a="http://schemas.openxmlformats.org/drawingml/2006/main" xmlns:r="http://schemas.openxmlformats.org/officeDocument/2006/relationships" xmlns:p="http://schemas.openxmlformats.org/presentationml/2006/main">
+  <p:cSld>
+    <p:spTree>
+      <p:nvGrpSpPr>
+        <p:cNvPr id="1" name=""/>
+        <p:cNvGrpSpPr/>
+        <p:nvPr/>
+      </p:nvGrpSpPr>
+      <p:grpSpPr>
+        <a:xfrm>
+          <a:off x="0" y="0"/>
+          <a:ext cx="0" cy="0"/>
+          <a:chOff x="0" y="0"/>
+          <a:chExt cx="0" cy="0"/>
+        </a:xfrm>
+      </p:grpSpPr>
+      <p:sp>
+        <p:nvSpPr>
           <p:cNvPr id="5" name="Text Placeholder 4"/>
           <p:cNvSpPr>
             <a:spLocks noGrp="1"/>
@@ -18922,7 +19047,7 @@
         <p:spPr>
           <a:xfrm>
             <a:off x="274638" y="1212850"/>
-            <a:ext cx="11887200" cy="3693319"/>
+            <a:ext cx="11887200" cy="2899255"/>
           </a:xfrm>
         </p:spPr>
         <p:txBody>
@@ -19033,43 +19158,6 @@
               <a:buNone/>
             </a:pPr>
             <a:endParaRPr lang="en-US" dirty="0">
-              <a:latin typeface="+mj-lt"/>
-            </a:endParaRPr>
-          </a:p>
-          <a:p>
-            <a:pPr marL="241300" lvl="1" indent="0">
-              <a:buNone/>
-            </a:pPr>
-            <a:r>
-              <a:rPr lang="en-US" dirty="0">
-                <a:latin typeface="+mj-lt"/>
-              </a:rPr>
-              <a:t>The Future of Game Development on </a:t>
-            </a:r>
-            <a:r>
-              <a:rPr lang="en-US" dirty="0" smtClean="0">
-                <a:latin typeface="+mj-lt"/>
-              </a:rPr>
-              <a:t>Windows ROOM</a:t>
-            </a:r>
-            <a:r>
-              <a:rPr lang="en-US" dirty="0">
-                <a:latin typeface="+mj-lt"/>
-              </a:rPr>
-              <a:t>: Marriott 6</a:t>
-            </a:r>
-            <a:r>
-              <a:rPr lang="en-US" sz="2800" dirty="0">
-                <a:latin typeface="+mj-lt"/>
-              </a:rPr>
-              <a:t/>
-            </a:r>
-            <a:br>
-              <a:rPr lang="en-US" sz="2800" dirty="0">
-                <a:latin typeface="+mj-lt"/>
-              </a:rPr>
-            </a:br>
-            <a:endParaRPr lang="en-US" sz="2800" dirty="0">
               <a:latin typeface="+mj-lt"/>
             </a:endParaRPr>
           </a:p>
@@ -19138,7 +19226,7 @@
 </p:sld>
 </file>
 
-<file path=ppt/slides/slide13.xml><?xml version="1.0" encoding="utf-8"?>
+<file path=ppt/slides/slide14.xml><?xml version="1.0" encoding="utf-8"?>
 <p:sld xmlns:a="http://schemas.openxmlformats.org/drawingml/2006/main" xmlns:r="http://schemas.openxmlformats.org/officeDocument/2006/relationships" xmlns:p="http://schemas.openxmlformats.org/presentationml/2006/main">
   <p:cSld>
     <p:spTree>
@@ -19741,7 +19829,7 @@
 </p:sld>
 </file>
 
-<file path=ppt/slides/slide14.xml><?xml version="1.0" encoding="utf-8"?>
+<file path=ppt/slides/slide15.xml><?xml version="1.0" encoding="utf-8"?>
 <p:sld xmlns:a="http://schemas.openxmlformats.org/drawingml/2006/main" xmlns:r="http://schemas.openxmlformats.org/officeDocument/2006/relationships" xmlns:p="http://schemas.openxmlformats.org/presentationml/2006/main">
   <p:cSld>
     <p:spTree>
@@ -20100,7 +20188,7 @@
 </p:sld>
 </file>
 
-<file path=ppt/slides/slide15.xml><?xml version="1.0" encoding="utf-8"?>
+<file path=ppt/slides/slide16.xml><?xml version="1.0" encoding="utf-8"?>
 <p:sld xmlns:a="http://schemas.openxmlformats.org/drawingml/2006/main" xmlns:r="http://schemas.openxmlformats.org/officeDocument/2006/relationships" xmlns:p="http://schemas.openxmlformats.org/presentationml/2006/main">
   <p:cSld>
     <p:spTree>
@@ -20510,32 +20598,7 @@
                 <a:ea typeface="Segoe UI" pitchFamily="34" charset="0"/>
                 <a:cs typeface="Segoe UI" pitchFamily="34" charset="0"/>
               </a:rPr>
-              <a:t>66+ </a:t>
-            </a:r>
-            <a:r>
-              <a:rPr lang="en-US" dirty="0" smtClean="0">
-                <a:gradFill>
-                  <a:gsLst>
-                    <a:gs pos="0">
-                      <a:srgbClr val="FFFFFF"/>
-                    </a:gs>
-                    <a:gs pos="100000">
-                      <a:srgbClr val="FFFFFF"/>
-                    </a:gs>
-                  </a:gsLst>
-                  <a:lin ang="5400000" scaled="0"/>
-                </a:gradFill>
-                <a:effectLst>
-                  <a:outerShdw blurRad="38100" dist="38100" dir="2700000" algn="tl">
-                    <a:srgbClr val="000000">
-                      <a:alpha val="43137"/>
-                    </a:srgbClr>
-                  </a:outerShdw>
-                </a:effectLst>
-                <a:ea typeface="Segoe UI" pitchFamily="34" charset="0"/>
-                <a:cs typeface="Segoe UI" pitchFamily="34" charset="0"/>
-              </a:rPr>
-              <a:t>Individuals</a:t>
+              <a:t>66+ Individuals</a:t>
             </a:r>
             <a:endParaRPr lang="en-US" dirty="0">
               <a:gradFill>
@@ -29173,12 +29236,6 @@
 </file>
 
 <file path=customXml/item1.xml><?xml version="1.0" encoding="utf-8"?>
-<p:properties xmlns:p="http://schemas.microsoft.com/office/2006/metadata/properties" xmlns:xsi="http://www.w3.org/2001/XMLSchema-instance" xmlns:pc="http://schemas.microsoft.com/office/infopath/2007/PartnerControls">
-  <documentManagement/>
-</p:properties>
-</file>
-
-<file path=customXml/item2.xml><?xml version="1.0" encoding="utf-8"?>
 <ct:contentTypeSchema xmlns:ct="http://schemas.microsoft.com/office/2006/metadata/contentType" xmlns:ma="http://schemas.microsoft.com/office/2006/metadata/properties/metaAttributes" ct:_="" ma:_="" ma:contentTypeName="Document" ma:contentTypeID="0x010100F50271A20F7B3C41B827A8F04D548019" ma:contentTypeVersion="2" ma:contentTypeDescription="Create a new document." ma:contentTypeScope="" ma:versionID="0f5b4adeca3fa452dfd663ff4e0777e3">
   <xsd:schema xmlns:xsd="http://www.w3.org/2001/XMLSchema" xmlns:xs="http://www.w3.org/2001/XMLSchema" xmlns:p="http://schemas.microsoft.com/office/2006/metadata/properties" xmlns:ns2="f85c541c-390e-4fa8-b262-5da5c5cfad75" targetNamespace="http://schemas.microsoft.com/office/2006/metadata/properties" ma:root="true" ma:fieldsID="592d4a22e1cc7090506e0998bb31d05e" ns2:_="">
     <xsd:import namespace="f85c541c-390e-4fa8-b262-5da5c5cfad75"/>
@@ -29326,6 +29383,12 @@
 </ct:contentTypeSchema>
 </file>
 
+<file path=customXml/item2.xml><?xml version="1.0" encoding="utf-8"?>
+<p:properties xmlns:p="http://schemas.microsoft.com/office/2006/metadata/properties" xmlns:xsi="http://www.w3.org/2001/XMLSchema-instance" xmlns:pc="http://schemas.microsoft.com/office/infopath/2007/PartnerControls">
+  <documentManagement/>
+</p:properties>
+</file>
+
 <file path=customXml/item3.xml><?xml version="1.0" encoding="utf-8"?>
 <?mso-contentType ?>
 <FormTemplates xmlns="http://schemas.microsoft.com/sharepoint/v3/contenttype/forms">
@@ -29336,22 +29399,6 @@
 </file>
 
 <file path=customXml/itemProps1.xml><?xml version="1.0" encoding="utf-8"?>
-<ds:datastoreItem xmlns:ds="http://schemas.openxmlformats.org/officeDocument/2006/customXml" ds:itemID="{F990F116-B58F-4255-B05B-DA3808E0E5C6}">
-  <ds:schemaRefs>
-    <ds:schemaRef ds:uri="http://purl.org/dc/terms/"/>
-    <ds:schemaRef ds:uri="http://schemas.openxmlformats.org/package/2006/metadata/core-properties"/>
-    <ds:schemaRef ds:uri="http://schemas.microsoft.com/office/2006/documentManagement/types"/>
-    <ds:schemaRef ds:uri="http://schemas.microsoft.com/office/infopath/2007/PartnerControls"/>
-    <ds:schemaRef ds:uri="http://purl.org/dc/elements/1.1/"/>
-    <ds:schemaRef ds:uri="http://schemas.microsoft.com/office/2006/metadata/properties"/>
-    <ds:schemaRef ds:uri="f85c541c-390e-4fa8-b262-5da5c5cfad75"/>
-    <ds:schemaRef ds:uri="http://www.w3.org/XML/1998/namespace"/>
-    <ds:schemaRef ds:uri="http://purl.org/dc/dcmitype/"/>
-  </ds:schemaRefs>
-</ds:datastoreItem>
-</file>
-
-<file path=customXml/itemProps2.xml><?xml version="1.0" encoding="utf-8"?>
 <ds:datastoreItem xmlns:ds="http://schemas.openxmlformats.org/officeDocument/2006/customXml" ds:itemID="{16C79B61-263D-4889-954E-B7F93FBE6617}">
   <ds:schemaRefs>
     <ds:schemaRef ds:uri="http://schemas.microsoft.com/office/2006/metadata/contentType"/>
@@ -29369,6 +29416,22 @@
 </ds:datastoreItem>
 </file>
 
+<file path=customXml/itemProps2.xml><?xml version="1.0" encoding="utf-8"?>
+<ds:datastoreItem xmlns:ds="http://schemas.openxmlformats.org/officeDocument/2006/customXml" ds:itemID="{F990F116-B58F-4255-B05B-DA3808E0E5C6}">
+  <ds:schemaRefs>
+    <ds:schemaRef ds:uri="http://purl.org/dc/terms/"/>
+    <ds:schemaRef ds:uri="http://schemas.openxmlformats.org/package/2006/metadata/core-properties"/>
+    <ds:schemaRef ds:uri="http://schemas.microsoft.com/office/2006/documentManagement/types"/>
+    <ds:schemaRef ds:uri="http://schemas.microsoft.com/office/infopath/2007/PartnerControls"/>
+    <ds:schemaRef ds:uri="http://purl.org/dc/elements/1.1/"/>
+    <ds:schemaRef ds:uri="http://schemas.microsoft.com/office/2006/metadata/properties"/>
+    <ds:schemaRef ds:uri="f85c541c-390e-4fa8-b262-5da5c5cfad75"/>
+    <ds:schemaRef ds:uri="http://www.w3.org/XML/1998/namespace"/>
+    <ds:schemaRef ds:uri="http://purl.org/dc/dcmitype/"/>
+  </ds:schemaRefs>
+</ds:datastoreItem>
+</file>
+
 <file path=customXml/itemProps3.xml><?xml version="1.0" encoding="utf-8"?>
 <ds:datastoreItem xmlns:ds="http://schemas.openxmlformats.org/officeDocument/2006/customXml" ds:itemID="{758FDAC0-319D-4A54-8D8E-1D42CB1F8004}">
   <ds:schemaRefs>

</xml_diff>

<commit_message>
updated OpenGL ES 3.0 support
</commit_message>
<xml_diff>
--- a/Presentation.pptx
+++ b/Presentation.pptx
@@ -261,7 +261,7 @@
               <a:rPr lang="en-US" smtClean="0">
                 <a:latin typeface="Segoe UI" pitchFamily="34" charset="0"/>
               </a:rPr>
-              <a:t>3/23/2016 8:30 AM</a:t>
+              <a:t>3/23/2016 12:01 PM</a:t>
             </a:fld>
             <a:endParaRPr lang="en-US" dirty="0">
               <a:latin typeface="Segoe UI" pitchFamily="34" charset="0"/>
@@ -559,7 +559,7 @@
           <a:p>
             <a:fld id="{38EEC551-8CDA-4EB6-89BB-2A86C9F091C8}" type="datetime8">
               <a:rPr lang="en-US" smtClean="0"/>
-              <a:t>3/23/2016 8:30 AM</a:t>
+              <a:t>3/23/2016 12:01 PM</a:t>
             </a:fld>
             <a:endParaRPr lang="en-US" dirty="0"/>
           </a:p>
@@ -947,7 +947,7 @@
           <a:p>
             <a:fld id="{38EEC551-8CDA-4EB6-89BB-2A86C9F091C8}" type="datetime8">
               <a:rPr lang="en-US" smtClean="0"/>
-              <a:t>3/23/2016 8:30 AM</a:t>
+              <a:t>3/23/2016 12:01 PM</a:t>
             </a:fld>
             <a:endParaRPr lang="en-US" dirty="0"/>
           </a:p>
@@ -1341,7 +1341,7 @@
           <a:p>
             <a:fld id="{38EEC551-8CDA-4EB6-89BB-2A86C9F091C8}" type="datetime8">
               <a:rPr lang="en-US" smtClean="0"/>
-              <a:t>3/23/2016 8:30 AM</a:t>
+              <a:t>3/23/2016 12:01 PM</a:t>
             </a:fld>
             <a:endParaRPr lang="en-US" dirty="0"/>
           </a:p>
@@ -1547,7 +1547,7 @@
                 </a:solidFill>
               </a:rPr>
               <a:pPr/>
-              <a:t>3/23/2016 8:30 AM</a:t>
+              <a:t>3/23/2016 12:01 PM</a:t>
             </a:fld>
             <a:endParaRPr lang="en-US" dirty="0">
               <a:solidFill>
@@ -1724,7 +1724,7 @@
           <a:p>
             <a:fld id="{90EC29EE-A8AD-4CE0-9C0B-116E0D4D7533}" type="datetime8">
               <a:rPr lang="en-US" smtClean="0"/>
-              <a:t>3/23/2016 8:30 AM</a:t>
+              <a:t>3/23/2016 12:01 PM</a:t>
             </a:fld>
             <a:endParaRPr lang="en-US" dirty="0"/>
           </a:p>
@@ -1922,7 +1922,7 @@
                 </a:solidFill>
               </a:rPr>
               <a:pPr/>
-              <a:t>3/23/2016 8:30 AM</a:t>
+              <a:t>3/23/2016 12:01 PM</a:t>
             </a:fld>
             <a:endParaRPr lang="en-US" dirty="0">
               <a:solidFill>
@@ -2272,7 +2272,7 @@
           <a:p>
             <a:fld id="{90EC29EE-A8AD-4CE0-9C0B-116E0D4D7533}" type="datetime8">
               <a:rPr lang="en-US" smtClean="0"/>
-              <a:t>3/23/2016 8:30 AM</a:t>
+              <a:t>3/23/2016 12:01 PM</a:t>
             </a:fld>
             <a:endParaRPr lang="en-US" dirty="0"/>
           </a:p>
@@ -2626,7 +2626,7 @@
           <a:p>
             <a:fld id="{38EEC551-8CDA-4EB6-89BB-2A86C9F091C8}" type="datetime8">
               <a:rPr lang="en-US" smtClean="0"/>
-              <a:t>3/23/2016 8:30 AM</a:t>
+              <a:t>3/23/2016 12:01 PM</a:t>
             </a:fld>
             <a:endParaRPr lang="en-US" dirty="0"/>
           </a:p>
@@ -24660,7 +24660,11 @@
             <a:graphicFrameLocks noGrp="1"/>
           </p:cNvGraphicFramePr>
           <p:nvPr>
-            <p:extLst/>
+            <p:extLst>
+              <p:ext uri="{D42A27DB-BD31-4B8C-83A1-F6EECF244321}">
+                <p14:modId xmlns:p14="http://schemas.microsoft.com/office/powerpoint/2010/main" val="3089228446"/>
+              </p:ext>
+            </p:extLst>
           </p:nvPr>
         </p:nvGraphicFramePr>
         <p:xfrm>
@@ -25185,6 +25189,28 @@
                     </a:p>
                     <a:p>
                       <a:r>
+                        <a:rPr lang="en-US" sz="1400" smtClean="0">
+                          <a:gradFill>
+                            <a:gsLst>
+                              <a:gs pos="66981">
+                                <a:schemeClr val="tx1">
+                                  <a:lumMod val="75000"/>
+                                  <a:lumOff val="25000"/>
+                                </a:schemeClr>
+                              </a:gs>
+                              <a:gs pos="0">
+                                <a:schemeClr val="tx1">
+                                  <a:lumMod val="75000"/>
+                                  <a:lumOff val="25000"/>
+                                </a:schemeClr>
+                              </a:gs>
+                            </a:gsLst>
+                            <a:lin ang="5400000" scaled="0"/>
+                          </a:gradFill>
+                        </a:rPr>
+                        <a:t>Most </a:t>
+                      </a:r>
+                      <a:r>
                         <a:rPr lang="en-US" sz="1400" dirty="0" smtClean="0">
                           <a:gradFill>
                             <a:gsLst>
@@ -25204,7 +25230,7 @@
                             <a:lin ang="5400000" scaled="0"/>
                           </a:gradFill>
                         </a:rPr>
-                        <a:t>Part of OpenGL ES 3.0</a:t>
+                        <a:t>of OpenGL ES 3.0</a:t>
                       </a:r>
                       <a:endParaRPr lang="en-US" sz="1400" dirty="0">
                         <a:gradFill>
@@ -29236,6 +29262,12 @@
 </file>
 
 <file path=customXml/item1.xml><?xml version="1.0" encoding="utf-8"?>
+<p:properties xmlns:p="http://schemas.microsoft.com/office/2006/metadata/properties" xmlns:xsi="http://www.w3.org/2001/XMLSchema-instance" xmlns:pc="http://schemas.microsoft.com/office/infopath/2007/PartnerControls">
+  <documentManagement/>
+</p:properties>
+</file>
+
+<file path=customXml/item2.xml><?xml version="1.0" encoding="utf-8"?>
 <ct:contentTypeSchema xmlns:ct="http://schemas.microsoft.com/office/2006/metadata/contentType" xmlns:ma="http://schemas.microsoft.com/office/2006/metadata/properties/metaAttributes" ct:_="" ma:_="" ma:contentTypeName="Document" ma:contentTypeID="0x010100F50271A20F7B3C41B827A8F04D548019" ma:contentTypeVersion="2" ma:contentTypeDescription="Create a new document." ma:contentTypeScope="" ma:versionID="0f5b4adeca3fa452dfd663ff4e0777e3">
   <xsd:schema xmlns:xsd="http://www.w3.org/2001/XMLSchema" xmlns:xs="http://www.w3.org/2001/XMLSchema" xmlns:p="http://schemas.microsoft.com/office/2006/metadata/properties" xmlns:ns2="f85c541c-390e-4fa8-b262-5da5c5cfad75" targetNamespace="http://schemas.microsoft.com/office/2006/metadata/properties" ma:root="true" ma:fieldsID="592d4a22e1cc7090506e0998bb31d05e" ns2:_="">
     <xsd:import namespace="f85c541c-390e-4fa8-b262-5da5c5cfad75"/>
@@ -29383,12 +29415,6 @@
 </ct:contentTypeSchema>
 </file>
 
-<file path=customXml/item2.xml><?xml version="1.0" encoding="utf-8"?>
-<p:properties xmlns:p="http://schemas.microsoft.com/office/2006/metadata/properties" xmlns:xsi="http://www.w3.org/2001/XMLSchema-instance" xmlns:pc="http://schemas.microsoft.com/office/infopath/2007/PartnerControls">
-  <documentManagement/>
-</p:properties>
-</file>
-
 <file path=customXml/item3.xml><?xml version="1.0" encoding="utf-8"?>
 <?mso-contentType ?>
 <FormTemplates xmlns="http://schemas.microsoft.com/sharepoint/v3/contenttype/forms">
@@ -29399,6 +29425,22 @@
 </file>
 
 <file path=customXml/itemProps1.xml><?xml version="1.0" encoding="utf-8"?>
+<ds:datastoreItem xmlns:ds="http://schemas.openxmlformats.org/officeDocument/2006/customXml" ds:itemID="{F990F116-B58F-4255-B05B-DA3808E0E5C6}">
+  <ds:schemaRefs>
+    <ds:schemaRef ds:uri="http://purl.org/dc/terms/"/>
+    <ds:schemaRef ds:uri="http://schemas.openxmlformats.org/package/2006/metadata/core-properties"/>
+    <ds:schemaRef ds:uri="http://schemas.microsoft.com/office/2006/documentManagement/types"/>
+    <ds:schemaRef ds:uri="http://schemas.microsoft.com/office/infopath/2007/PartnerControls"/>
+    <ds:schemaRef ds:uri="http://purl.org/dc/elements/1.1/"/>
+    <ds:schemaRef ds:uri="http://schemas.microsoft.com/office/2006/metadata/properties"/>
+    <ds:schemaRef ds:uri="f85c541c-390e-4fa8-b262-5da5c5cfad75"/>
+    <ds:schemaRef ds:uri="http://www.w3.org/XML/1998/namespace"/>
+    <ds:schemaRef ds:uri="http://purl.org/dc/dcmitype/"/>
+  </ds:schemaRefs>
+</ds:datastoreItem>
+</file>
+
+<file path=customXml/itemProps2.xml><?xml version="1.0" encoding="utf-8"?>
 <ds:datastoreItem xmlns:ds="http://schemas.openxmlformats.org/officeDocument/2006/customXml" ds:itemID="{16C79B61-263D-4889-954E-B7F93FBE6617}">
   <ds:schemaRefs>
     <ds:schemaRef ds:uri="http://schemas.microsoft.com/office/2006/metadata/contentType"/>
@@ -29416,22 +29458,6 @@
 </ds:datastoreItem>
 </file>
 
-<file path=customXml/itemProps2.xml><?xml version="1.0" encoding="utf-8"?>
-<ds:datastoreItem xmlns:ds="http://schemas.openxmlformats.org/officeDocument/2006/customXml" ds:itemID="{F990F116-B58F-4255-B05B-DA3808E0E5C6}">
-  <ds:schemaRefs>
-    <ds:schemaRef ds:uri="http://purl.org/dc/terms/"/>
-    <ds:schemaRef ds:uri="http://schemas.openxmlformats.org/package/2006/metadata/core-properties"/>
-    <ds:schemaRef ds:uri="http://schemas.microsoft.com/office/2006/documentManagement/types"/>
-    <ds:schemaRef ds:uri="http://schemas.microsoft.com/office/infopath/2007/PartnerControls"/>
-    <ds:schemaRef ds:uri="http://purl.org/dc/elements/1.1/"/>
-    <ds:schemaRef ds:uri="http://schemas.microsoft.com/office/2006/metadata/properties"/>
-    <ds:schemaRef ds:uri="f85c541c-390e-4fa8-b262-5da5c5cfad75"/>
-    <ds:schemaRef ds:uri="http://www.w3.org/XML/1998/namespace"/>
-    <ds:schemaRef ds:uri="http://purl.org/dc/dcmitype/"/>
-  </ds:schemaRefs>
-</ds:datastoreItem>
-</file>
-
 <file path=customXml/itemProps3.xml><?xml version="1.0" encoding="utf-8"?>
 <ds:datastoreItem xmlns:ds="http://schemas.openxmlformats.org/officeDocument/2006/customXml" ds:itemID="{758FDAC0-319D-4A54-8D8E-1D42CB1F8004}">
   <ds:schemaRefs>

</xml_diff>

<commit_message>
added exercise url shortcuts
</commit_message>
<xml_diff>
--- a/Presentation.pptx
+++ b/Presentation.pptx
@@ -22,9 +22,9 @@
     <p:sldId id="1456" r:id="rId13"/>
     <p:sldId id="1459" r:id="rId14"/>
     <p:sldId id="1470" r:id="rId15"/>
-    <p:sldId id="1460" r:id="rId16"/>
-    <p:sldId id="1479" r:id="rId17"/>
-    <p:sldId id="1473" r:id="rId18"/>
+    <p:sldId id="1479" r:id="rId16"/>
+    <p:sldId id="1473" r:id="rId17"/>
+    <p:sldId id="1480" r:id="rId18"/>
     <p:sldId id="1474" r:id="rId19"/>
     <p:sldId id="1475" r:id="rId20"/>
     <p:sldId id="1476" r:id="rId21"/>
@@ -263,7 +263,7 @@
               <a:rPr lang="en-US" smtClean="0">
                 <a:latin typeface="Segoe UI" pitchFamily="34" charset="0"/>
               </a:rPr>
-              <a:t>3/30/2016 10:51 AM</a:t>
+              <a:t>3/30/2016 9:39 PM</a:t>
             </a:fld>
             <a:endParaRPr lang="en-US" dirty="0">
               <a:latin typeface="Segoe UI" pitchFamily="34" charset="0"/>
@@ -544,7 +544,7 @@
           <a:p>
             <a:fld id="{38EEC551-8CDA-4EB6-89BB-2A86C9F091C8}" type="datetime8">
               <a:rPr lang="en-US" smtClean="0"/>
-              <a:t>3/30/2016 10:51 AM</a:t>
+              <a:t>3/30/2016 9:39 PM</a:t>
             </a:fld>
             <a:endParaRPr lang="en-US" dirty="0"/>
           </a:p>
@@ -930,7 +930,7 @@
           <a:p>
             <a:fld id="{38EEC551-8CDA-4EB6-89BB-2A86C9F091C8}" type="datetime8">
               <a:rPr lang="en-US" smtClean="0"/>
-              <a:t>3/30/2016 10:51 AM</a:t>
+              <a:t>3/30/2016 9:39 PM</a:t>
             </a:fld>
             <a:endParaRPr lang="en-US" dirty="0"/>
           </a:p>
@@ -1018,204 +1018,6 @@
           <a:lstStyle/>
           <a:p>
             <a:r>
-              <a:rPr lang="en-US" dirty="0"/>
-              <a:t>You should get to this slide no later than 10 minutes into the session</a:t>
-            </a:r>
-          </a:p>
-          <a:p>
-            <a:endParaRPr lang="en-US" dirty="0"/>
-          </a:p>
-          <a:p>
-            <a:r>
-              <a:rPr lang="en-US" dirty="0"/>
-              <a:t>Show how to get to the lab</a:t>
-            </a:r>
-            <a:r>
-              <a:rPr lang="en-US" baseline="0" dirty="0"/>
-              <a:t> on the workstation, and then leave this slide up on the projector.</a:t>
-            </a:r>
-            <a:endParaRPr lang="en-US" dirty="0"/>
-          </a:p>
-        </p:txBody>
-      </p:sp>
-      <p:sp>
-        <p:nvSpPr>
-          <p:cNvPr id="4" name="Header Placeholder 3"/>
-          <p:cNvSpPr>
-            <a:spLocks noGrp="1"/>
-          </p:cNvSpPr>
-          <p:nvPr>
-            <p:ph type="hdr" sz="quarter" idx="10"/>
-          </p:nvPr>
-        </p:nvSpPr>
-        <p:spPr/>
-        <p:txBody>
-          <a:bodyPr/>
-          <a:lstStyle/>
-          <a:p>
-            <a:endParaRPr lang="en-US" dirty="0"/>
-          </a:p>
-        </p:txBody>
-      </p:sp>
-      <p:sp>
-        <p:nvSpPr>
-          <p:cNvPr id="5" name="Footer Placeholder 4"/>
-          <p:cNvSpPr>
-            <a:spLocks noGrp="1"/>
-          </p:cNvSpPr>
-          <p:nvPr>
-            <p:ph type="ftr" sz="quarter" idx="11"/>
-          </p:nvPr>
-        </p:nvSpPr>
-        <p:spPr/>
-        <p:txBody>
-          <a:bodyPr/>
-          <a:lstStyle/>
-          <a:p>
-            <a:pPr defTabSz="914099" eaLnBrk="0" hangingPunct="0"/>
-            <a:r>
-              <a:rPr lang="en-US" sz="400">
-                <a:gradFill>
-                  <a:gsLst>
-                    <a:gs pos="0">
-                      <a:prstClr val="black"/>
-                    </a:gs>
-                    <a:gs pos="100000">
-                      <a:prstClr val="black"/>
-                    </a:gs>
-                  </a:gsLst>
-                  <a:lin ang="5400000" scaled="0"/>
-                </a:gradFill>
-                <a:latin typeface="Segoe UI" pitchFamily="34" charset="0"/>
-                <a:ea typeface="Segoe UI" pitchFamily="34" charset="0"/>
-                <a:cs typeface="Segoe UI" pitchFamily="34" charset="0"/>
-              </a:rPr>
-              <a:t>© 2014 Microsoft Corporation. All rights reserved. MICROSOFT MAKES NO WARRANTIES, EXPRESS, IMPLIED OR STATUTORY, AS TO THE INFORMATION IN THIS PRESENTATION.</a:t>
-            </a:r>
-            <a:endParaRPr lang="en-US" sz="400" dirty="0">
-              <a:gradFill>
-                <a:gsLst>
-                  <a:gs pos="0">
-                    <a:prstClr val="black"/>
-                  </a:gs>
-                  <a:gs pos="100000">
-                    <a:prstClr val="black"/>
-                  </a:gs>
-                </a:gsLst>
-                <a:lin ang="5400000" scaled="0"/>
-              </a:gradFill>
-              <a:latin typeface="Segoe UI" pitchFamily="34" charset="0"/>
-              <a:ea typeface="Segoe UI" pitchFamily="34" charset="0"/>
-              <a:cs typeface="Segoe UI" pitchFamily="34" charset="0"/>
-            </a:endParaRPr>
-          </a:p>
-        </p:txBody>
-      </p:sp>
-      <p:sp>
-        <p:nvSpPr>
-          <p:cNvPr id="6" name="Date Placeholder 5"/>
-          <p:cNvSpPr>
-            <a:spLocks noGrp="1"/>
-          </p:cNvSpPr>
-          <p:nvPr>
-            <p:ph type="dt" idx="12"/>
-          </p:nvPr>
-        </p:nvSpPr>
-        <p:spPr/>
-        <p:txBody>
-          <a:bodyPr/>
-          <a:lstStyle/>
-          <a:p>
-            <a:fld id="{38EEC551-8CDA-4EB6-89BB-2A86C9F091C8}" type="datetime8">
-              <a:rPr lang="en-US" smtClean="0"/>
-              <a:t>3/30/2016 10:51 AM</a:t>
-            </a:fld>
-            <a:endParaRPr lang="en-US" dirty="0"/>
-          </a:p>
-        </p:txBody>
-      </p:sp>
-      <p:sp>
-        <p:nvSpPr>
-          <p:cNvPr id="7" name="Slide Number Placeholder 6"/>
-          <p:cNvSpPr>
-            <a:spLocks noGrp="1"/>
-          </p:cNvSpPr>
-          <p:nvPr>
-            <p:ph type="sldNum" sz="quarter" idx="13"/>
-          </p:nvPr>
-        </p:nvSpPr>
-        <p:spPr/>
-        <p:txBody>
-          <a:bodyPr/>
-          <a:lstStyle/>
-          <a:p>
-            <a:fld id="{B4008EB6-D09E-4580-8CD6-DDB14511944F}" type="slidenum">
-              <a:rPr lang="en-US" smtClean="0"/>
-              <a:pPr/>
-              <a:t>12</a:t>
-            </a:fld>
-            <a:endParaRPr lang="en-US" dirty="0"/>
-          </a:p>
-        </p:txBody>
-      </p:sp>
-    </p:spTree>
-    <p:extLst>
-      <p:ext uri="{BB962C8B-B14F-4D97-AF65-F5344CB8AC3E}">
-        <p14:creationId xmlns:p14="http://schemas.microsoft.com/office/powerpoint/2010/main" val="2316892694"/>
-      </p:ext>
-    </p:extLst>
-  </p:cSld>
-  <p:clrMapOvr>
-    <a:masterClrMapping/>
-  </p:clrMapOvr>
-</p:notes>
-</file>
-
-<file path=ppt/notesSlides/notesSlide11.xml><?xml version="1.0" encoding="utf-8"?>
-<p:notes xmlns:a="http://schemas.openxmlformats.org/drawingml/2006/main" xmlns:r="http://schemas.openxmlformats.org/officeDocument/2006/relationships" xmlns:p="http://schemas.openxmlformats.org/presentationml/2006/main">
-  <p:cSld>
-    <p:spTree>
-      <p:nvGrpSpPr>
-        <p:cNvPr id="1" name=""/>
-        <p:cNvGrpSpPr/>
-        <p:nvPr/>
-      </p:nvGrpSpPr>
-      <p:grpSpPr>
-        <a:xfrm>
-          <a:off x="0" y="0"/>
-          <a:ext cx="0" cy="0"/>
-          <a:chOff x="0" y="0"/>
-          <a:chExt cx="0" cy="0"/>
-        </a:xfrm>
-      </p:grpSpPr>
-      <p:sp>
-        <p:nvSpPr>
-          <p:cNvPr id="2" name="Slide Image Placeholder 1"/>
-          <p:cNvSpPr>
-            <a:spLocks noGrp="1" noRot="1" noChangeAspect="1"/>
-          </p:cNvSpPr>
-          <p:nvPr>
-            <p:ph type="sldImg"/>
-          </p:nvPr>
-        </p:nvSpPr>
-        <p:spPr/>
-      </p:sp>
-      <p:sp>
-        <p:nvSpPr>
-          <p:cNvPr id="3" name="Notes Placeholder 2"/>
-          <p:cNvSpPr>
-            <a:spLocks noGrp="1"/>
-          </p:cNvSpPr>
-          <p:nvPr>
-            <p:ph type="body" idx="1"/>
-          </p:nvPr>
-        </p:nvSpPr>
-        <p:spPr/>
-        <p:txBody>
-          <a:bodyPr/>
-          <a:lstStyle/>
-          <a:p>
-            <a:r>
               <a:rPr lang="en-US" baseline="0" dirty="0"/>
               <a:t>“As a follow-on to this lab, we also have the Azure IoT lab. In that, you’ll learn how to use the Raspberry Pi to send sensor data to IoT Hub and process it using other Azure IoT services.</a:t>
             </a:r>
@@ -1295,7 +1097,7 @@
                 <a:tabLst/>
                 <a:defRPr/>
               </a:pPr>
-              <a:t>13</a:t>
+              <a:t>12</a:t>
             </a:fld>
             <a:endParaRPr kumimoji="0" lang="en-US" sz="1200" b="0" i="0" u="none" strike="noStrike" kern="1200" cap="none" spc="0" normalizeH="0" baseline="0" noProof="0">
               <a:ln>
@@ -1327,7 +1129,7 @@
 </p:notes>
 </file>
 
-<file path=ppt/notesSlides/notesSlide12.xml><?xml version="1.0" encoding="utf-8"?>
+<file path=ppt/notesSlides/notesSlide11.xml><?xml version="1.0" encoding="utf-8"?>
 <p:notes xmlns:a="http://schemas.openxmlformats.org/drawingml/2006/main" xmlns:r="http://schemas.openxmlformats.org/officeDocument/2006/relationships" xmlns:p="http://schemas.openxmlformats.org/presentationml/2006/main">
   <p:cSld>
     <p:spTree>
@@ -1483,7 +1285,7 @@
 </p:notes>
 </file>
 
-<file path=ppt/notesSlides/notesSlide13.xml><?xml version="1.0" encoding="utf-8"?>
+<file path=ppt/notesSlides/notesSlide12.xml><?xml version="1.0" encoding="utf-8"?>
 <p:notes xmlns:a="http://schemas.openxmlformats.org/drawingml/2006/main" xmlns:r="http://schemas.openxmlformats.org/officeDocument/2006/relationships" xmlns:p="http://schemas.openxmlformats.org/presentationml/2006/main">
   <p:cSld>
     <p:spTree>
@@ -1639,7 +1441,7 @@
 </p:notes>
 </file>
 
-<file path=ppt/notesSlides/notesSlide14.xml><?xml version="1.0" encoding="utf-8"?>
+<file path=ppt/notesSlides/notesSlide13.xml><?xml version="1.0" encoding="utf-8"?>
 <p:notes xmlns:a="http://schemas.openxmlformats.org/drawingml/2006/main" xmlns:r="http://schemas.openxmlformats.org/officeDocument/2006/relationships" xmlns:p="http://schemas.openxmlformats.org/presentationml/2006/main">
   <p:cSld>
     <p:spTree>
@@ -1795,7 +1597,7 @@
 </p:notes>
 </file>
 
-<file path=ppt/notesSlides/notesSlide15.xml><?xml version="1.0" encoding="utf-8"?>
+<file path=ppt/notesSlides/notesSlide14.xml><?xml version="1.0" encoding="utf-8"?>
 <p:notes xmlns:a="http://schemas.openxmlformats.org/drawingml/2006/main" xmlns:r="http://schemas.openxmlformats.org/officeDocument/2006/relationships" xmlns:p="http://schemas.openxmlformats.org/presentationml/2006/main">
   <p:cSld>
     <p:spTree>
@@ -1951,7 +1753,7 @@
 </p:notes>
 </file>
 
-<file path=ppt/notesSlides/notesSlide16.xml><?xml version="1.0" encoding="utf-8"?>
+<file path=ppt/notesSlides/notesSlide15.xml><?xml version="1.0" encoding="utf-8"?>
 <p:notes xmlns:a="http://schemas.openxmlformats.org/drawingml/2006/main" xmlns:r="http://schemas.openxmlformats.org/officeDocument/2006/relationships" xmlns:p="http://schemas.openxmlformats.org/presentationml/2006/main">
   <p:cSld>
     <p:spTree>
@@ -2107,6 +1909,216 @@
 </p:notes>
 </file>
 
+<file path=ppt/notesSlides/notesSlide16.xml><?xml version="1.0" encoding="utf-8"?>
+<p:notes xmlns:a="http://schemas.openxmlformats.org/drawingml/2006/main" xmlns:r="http://schemas.openxmlformats.org/officeDocument/2006/relationships" xmlns:p="http://schemas.openxmlformats.org/presentationml/2006/main">
+  <p:cSld>
+    <p:spTree>
+      <p:nvGrpSpPr>
+        <p:cNvPr id="1" name=""/>
+        <p:cNvGrpSpPr/>
+        <p:nvPr/>
+      </p:nvGrpSpPr>
+      <p:grpSpPr>
+        <a:xfrm>
+          <a:off x="0" y="0"/>
+          <a:ext cx="0" cy="0"/>
+          <a:chOff x="0" y="0"/>
+          <a:chExt cx="0" cy="0"/>
+        </a:xfrm>
+      </p:grpSpPr>
+      <p:sp>
+        <p:nvSpPr>
+          <p:cNvPr id="2" name="Slide Image Placeholder 1"/>
+          <p:cNvSpPr>
+            <a:spLocks noGrp="1" noRot="1" noChangeAspect="1"/>
+          </p:cNvSpPr>
+          <p:nvPr>
+            <p:ph type="sldImg"/>
+          </p:nvPr>
+        </p:nvSpPr>
+        <p:spPr/>
+      </p:sp>
+      <p:sp>
+        <p:nvSpPr>
+          <p:cNvPr id="3" name="Notes Placeholder 2"/>
+          <p:cNvSpPr>
+            <a:spLocks noGrp="1"/>
+          </p:cNvSpPr>
+          <p:nvPr>
+            <p:ph type="body" idx="1"/>
+          </p:nvPr>
+        </p:nvSpPr>
+        <p:spPr/>
+        <p:txBody>
+          <a:bodyPr/>
+          <a:lstStyle/>
+          <a:p>
+            <a:pPr marL="0" marR="0" indent="0" algn="l" defTabSz="932742" rtl="0" eaLnBrk="1" fontAlgn="auto" latinLnBrk="0" hangingPunct="1">
+              <a:lnSpc>
+                <a:spcPct val="90000"/>
+              </a:lnSpc>
+              <a:spcBef>
+                <a:spcPts val="0"/>
+              </a:spcBef>
+              <a:spcAft>
+                <a:spcPts val="340"/>
+              </a:spcAft>
+              <a:buClrTx/>
+              <a:buSzTx/>
+              <a:buFontTx/>
+              <a:buNone/>
+              <a:tabLst/>
+              <a:defRPr/>
+            </a:pPr>
+            <a:r>
+              <a:rPr lang="en-US" b="1" dirty="0">
+                <a:latin typeface="Segoe"/>
+              </a:rPr>
+              <a:t>Speakers: </a:t>
+            </a:r>
+            <a:r>
+              <a:rPr lang="en-US" dirty="0">
+                <a:latin typeface="Segoe"/>
+              </a:rPr>
+              <a:t>Please note this slide will be updated with your session’s QR code during the scrub process which</a:t>
+            </a:r>
+            <a:r>
+              <a:rPr lang="en-US" baseline="0" dirty="0">
+                <a:latin typeface="Segoe"/>
+              </a:rPr>
+              <a:t> is </a:t>
+            </a:r>
+            <a:r>
+              <a:rPr lang="en-US" dirty="0">
+                <a:latin typeface="Segoe"/>
+              </a:rPr>
+              <a:t>outlined</a:t>
+            </a:r>
+            <a:r>
+              <a:rPr lang="en-US" baseline="0" dirty="0">
+                <a:latin typeface="Segoe"/>
+              </a:rPr>
+              <a:t> on side 3. Attendees can scan the QR code for access to your session’s </a:t>
+            </a:r>
+            <a:r>
+              <a:rPr lang="en-US" baseline="0" dirty="0" err="1">
+                <a:latin typeface="Segoe"/>
+              </a:rPr>
+              <a:t>eval</a:t>
+            </a:r>
+            <a:r>
+              <a:rPr lang="en-US" baseline="0" dirty="0">
+                <a:latin typeface="Segoe"/>
+              </a:rPr>
+              <a:t>.</a:t>
+            </a:r>
+            <a:endParaRPr lang="en-US" dirty="0">
+              <a:latin typeface="Segoe"/>
+            </a:endParaRPr>
+          </a:p>
+          <a:p>
+            <a:endParaRPr lang="en-US" dirty="0"/>
+          </a:p>
+        </p:txBody>
+      </p:sp>
+      <p:sp>
+        <p:nvSpPr>
+          <p:cNvPr id="4" name="Footer Placeholder 3"/>
+          <p:cNvSpPr>
+            <a:spLocks noGrp="1"/>
+          </p:cNvSpPr>
+          <p:nvPr>
+            <p:ph type="ftr" sz="quarter" idx="10"/>
+          </p:nvPr>
+        </p:nvSpPr>
+        <p:spPr/>
+        <p:txBody>
+          <a:bodyPr/>
+          <a:lstStyle/>
+          <a:p>
+            <a:pPr defTabSz="914099" eaLnBrk="0" hangingPunct="0"/>
+            <a:r>
+              <a:rPr lang="en-US" sz="400" dirty="0">
+                <a:gradFill>
+                  <a:gsLst>
+                    <a:gs pos="0">
+                      <a:prstClr val="black"/>
+                    </a:gs>
+                    <a:gs pos="100000">
+                      <a:prstClr val="black"/>
+                    </a:gs>
+                  </a:gsLst>
+                  <a:lin ang="5400000" scaled="0"/>
+                </a:gradFill>
+                <a:latin typeface="Segoe UI" pitchFamily="34" charset="0"/>
+                <a:ea typeface="Segoe UI" pitchFamily="34" charset="0"/>
+                <a:cs typeface="Segoe UI" pitchFamily="34" charset="0"/>
+              </a:rPr>
+              <a:t>© 2016 Microsoft Corporation. All rights reserved. Microsoft, Windows, and other product names are or may be registered trademarks and/or trademarks in the U.S. and/or other countries. The information herein is for informational purposes only and represents the current view of Microsoft Corporation as of the date of this presentation.  Because Microsoft must respond to changing market conditions, it should not be interpreted to be a commitment on the part of Microsoft, and Microsoft cannot guarantee the accuracy of any information provided after the date of this presentation.  MICROSOFT MAKES NO WARRANTIES, EXPRESS, IMPLIED OR STATUTORY, AS TO THE INFORMATION IN THIS PRESENTATION.</a:t>
+            </a:r>
+          </a:p>
+        </p:txBody>
+      </p:sp>
+      <p:sp>
+        <p:nvSpPr>
+          <p:cNvPr id="5" name="Date Placeholder 4"/>
+          <p:cNvSpPr>
+            <a:spLocks noGrp="1"/>
+          </p:cNvSpPr>
+          <p:nvPr>
+            <p:ph type="dt" idx="11"/>
+          </p:nvPr>
+        </p:nvSpPr>
+        <p:spPr/>
+        <p:txBody>
+          <a:bodyPr/>
+          <a:lstStyle/>
+          <a:p>
+            <a:fld id="{E74353ED-ACB2-44BF-A903-985B0AF962B7}" type="datetime1">
+              <a:rPr lang="en-US" smtClean="0"/>
+              <a:t>3/30/2016</a:t>
+            </a:fld>
+            <a:endParaRPr lang="en-US" dirty="0"/>
+          </a:p>
+        </p:txBody>
+      </p:sp>
+      <p:sp>
+        <p:nvSpPr>
+          <p:cNvPr id="6" name="Slide Number Placeholder 5"/>
+          <p:cNvSpPr>
+            <a:spLocks noGrp="1"/>
+          </p:cNvSpPr>
+          <p:nvPr>
+            <p:ph type="sldNum" sz="quarter" idx="12"/>
+          </p:nvPr>
+        </p:nvSpPr>
+        <p:spPr/>
+        <p:txBody>
+          <a:bodyPr/>
+          <a:lstStyle/>
+          <a:p>
+            <a:fld id="{B4008EB6-D09E-4580-8CD6-DDB14511944F}" type="slidenum">
+              <a:rPr lang="en-US" smtClean="0"/>
+              <a:pPr/>
+              <a:t>20</a:t>
+            </a:fld>
+            <a:endParaRPr lang="en-US" dirty="0"/>
+          </a:p>
+        </p:txBody>
+      </p:sp>
+    </p:spTree>
+    <p:extLst>
+      <p:ext uri="{BB962C8B-B14F-4D97-AF65-F5344CB8AC3E}">
+        <p14:creationId xmlns:p14="http://schemas.microsoft.com/office/powerpoint/2010/main" val="2642267037"/>
+      </p:ext>
+    </p:extLst>
+  </p:cSld>
+  <p:clrMapOvr>
+    <a:masterClrMapping/>
+  </p:clrMapOvr>
+</p:notes>
+</file>
+
 <file path=ppt/notesSlides/notesSlide17.xml><?xml version="1.0" encoding="utf-8"?>
 <p:notes xmlns:a="http://schemas.openxmlformats.org/drawingml/2006/main" xmlns:r="http://schemas.openxmlformats.org/officeDocument/2006/relationships" xmlns:p="http://schemas.openxmlformats.org/presentationml/2006/main">
   <p:cSld>
@@ -2151,216 +2163,6 @@
           <a:bodyPr/>
           <a:lstStyle/>
           <a:p>
-            <a:pPr marL="0" marR="0" indent="0" algn="l" defTabSz="932742" rtl="0" eaLnBrk="1" fontAlgn="auto" latinLnBrk="0" hangingPunct="1">
-              <a:lnSpc>
-                <a:spcPct val="90000"/>
-              </a:lnSpc>
-              <a:spcBef>
-                <a:spcPts val="0"/>
-              </a:spcBef>
-              <a:spcAft>
-                <a:spcPts val="340"/>
-              </a:spcAft>
-              <a:buClrTx/>
-              <a:buSzTx/>
-              <a:buFontTx/>
-              <a:buNone/>
-              <a:tabLst/>
-              <a:defRPr/>
-            </a:pPr>
-            <a:r>
-              <a:rPr lang="en-US" b="1" dirty="0">
-                <a:latin typeface="Segoe"/>
-              </a:rPr>
-              <a:t>Speakers: </a:t>
-            </a:r>
-            <a:r>
-              <a:rPr lang="en-US" dirty="0">
-                <a:latin typeface="Segoe"/>
-              </a:rPr>
-              <a:t>Please note this slide will be updated with your session’s QR code during the scrub process which</a:t>
-            </a:r>
-            <a:r>
-              <a:rPr lang="en-US" baseline="0" dirty="0">
-                <a:latin typeface="Segoe"/>
-              </a:rPr>
-              <a:t> is </a:t>
-            </a:r>
-            <a:r>
-              <a:rPr lang="en-US" dirty="0">
-                <a:latin typeface="Segoe"/>
-              </a:rPr>
-              <a:t>outlined</a:t>
-            </a:r>
-            <a:r>
-              <a:rPr lang="en-US" baseline="0" dirty="0">
-                <a:latin typeface="Segoe"/>
-              </a:rPr>
-              <a:t> on side 3. Attendees can scan the QR code for access to your session’s </a:t>
-            </a:r>
-            <a:r>
-              <a:rPr lang="en-US" baseline="0" dirty="0" err="1">
-                <a:latin typeface="Segoe"/>
-              </a:rPr>
-              <a:t>eval</a:t>
-            </a:r>
-            <a:r>
-              <a:rPr lang="en-US" baseline="0" dirty="0">
-                <a:latin typeface="Segoe"/>
-              </a:rPr>
-              <a:t>.</a:t>
-            </a:r>
-            <a:endParaRPr lang="en-US" dirty="0">
-              <a:latin typeface="Segoe"/>
-            </a:endParaRPr>
-          </a:p>
-          <a:p>
-            <a:endParaRPr lang="en-US" dirty="0"/>
-          </a:p>
-        </p:txBody>
-      </p:sp>
-      <p:sp>
-        <p:nvSpPr>
-          <p:cNvPr id="4" name="Footer Placeholder 3"/>
-          <p:cNvSpPr>
-            <a:spLocks noGrp="1"/>
-          </p:cNvSpPr>
-          <p:nvPr>
-            <p:ph type="ftr" sz="quarter" idx="10"/>
-          </p:nvPr>
-        </p:nvSpPr>
-        <p:spPr/>
-        <p:txBody>
-          <a:bodyPr/>
-          <a:lstStyle/>
-          <a:p>
-            <a:pPr defTabSz="914099" eaLnBrk="0" hangingPunct="0"/>
-            <a:r>
-              <a:rPr lang="en-US" sz="400" dirty="0">
-                <a:gradFill>
-                  <a:gsLst>
-                    <a:gs pos="0">
-                      <a:prstClr val="black"/>
-                    </a:gs>
-                    <a:gs pos="100000">
-                      <a:prstClr val="black"/>
-                    </a:gs>
-                  </a:gsLst>
-                  <a:lin ang="5400000" scaled="0"/>
-                </a:gradFill>
-                <a:latin typeface="Segoe UI" pitchFamily="34" charset="0"/>
-                <a:ea typeface="Segoe UI" pitchFamily="34" charset="0"/>
-                <a:cs typeface="Segoe UI" pitchFamily="34" charset="0"/>
-              </a:rPr>
-              <a:t>© 2016 Microsoft Corporation. All rights reserved. Microsoft, Windows, and other product names are or may be registered trademarks and/or trademarks in the U.S. and/or other countries. The information herein is for informational purposes only and represents the current view of Microsoft Corporation as of the date of this presentation.  Because Microsoft must respond to changing market conditions, it should not be interpreted to be a commitment on the part of Microsoft, and Microsoft cannot guarantee the accuracy of any information provided after the date of this presentation.  MICROSOFT MAKES NO WARRANTIES, EXPRESS, IMPLIED OR STATUTORY, AS TO THE INFORMATION IN THIS PRESENTATION.</a:t>
-            </a:r>
-          </a:p>
-        </p:txBody>
-      </p:sp>
-      <p:sp>
-        <p:nvSpPr>
-          <p:cNvPr id="5" name="Date Placeholder 4"/>
-          <p:cNvSpPr>
-            <a:spLocks noGrp="1"/>
-          </p:cNvSpPr>
-          <p:nvPr>
-            <p:ph type="dt" idx="11"/>
-          </p:nvPr>
-        </p:nvSpPr>
-        <p:spPr/>
-        <p:txBody>
-          <a:bodyPr/>
-          <a:lstStyle/>
-          <a:p>
-            <a:fld id="{E74353ED-ACB2-44BF-A903-985B0AF962B7}" type="datetime1">
-              <a:rPr lang="en-US" smtClean="0"/>
-              <a:t>3/30/2016</a:t>
-            </a:fld>
-            <a:endParaRPr lang="en-US" dirty="0"/>
-          </a:p>
-        </p:txBody>
-      </p:sp>
-      <p:sp>
-        <p:nvSpPr>
-          <p:cNvPr id="6" name="Slide Number Placeholder 5"/>
-          <p:cNvSpPr>
-            <a:spLocks noGrp="1"/>
-          </p:cNvSpPr>
-          <p:nvPr>
-            <p:ph type="sldNum" sz="quarter" idx="12"/>
-          </p:nvPr>
-        </p:nvSpPr>
-        <p:spPr/>
-        <p:txBody>
-          <a:bodyPr/>
-          <a:lstStyle/>
-          <a:p>
-            <a:fld id="{B4008EB6-D09E-4580-8CD6-DDB14511944F}" type="slidenum">
-              <a:rPr lang="en-US" smtClean="0"/>
-              <a:pPr/>
-              <a:t>20</a:t>
-            </a:fld>
-            <a:endParaRPr lang="en-US" dirty="0"/>
-          </a:p>
-        </p:txBody>
-      </p:sp>
-    </p:spTree>
-    <p:extLst>
-      <p:ext uri="{BB962C8B-B14F-4D97-AF65-F5344CB8AC3E}">
-        <p14:creationId xmlns:p14="http://schemas.microsoft.com/office/powerpoint/2010/main" val="2642267037"/>
-      </p:ext>
-    </p:extLst>
-  </p:cSld>
-  <p:clrMapOvr>
-    <a:masterClrMapping/>
-  </p:clrMapOvr>
-</p:notes>
-</file>
-
-<file path=ppt/notesSlides/notesSlide18.xml><?xml version="1.0" encoding="utf-8"?>
-<p:notes xmlns:a="http://schemas.openxmlformats.org/drawingml/2006/main" xmlns:r="http://schemas.openxmlformats.org/officeDocument/2006/relationships" xmlns:p="http://schemas.openxmlformats.org/presentationml/2006/main">
-  <p:cSld>
-    <p:spTree>
-      <p:nvGrpSpPr>
-        <p:cNvPr id="1" name=""/>
-        <p:cNvGrpSpPr/>
-        <p:nvPr/>
-      </p:nvGrpSpPr>
-      <p:grpSpPr>
-        <a:xfrm>
-          <a:off x="0" y="0"/>
-          <a:ext cx="0" cy="0"/>
-          <a:chOff x="0" y="0"/>
-          <a:chExt cx="0" cy="0"/>
-        </a:xfrm>
-      </p:grpSpPr>
-      <p:sp>
-        <p:nvSpPr>
-          <p:cNvPr id="2" name="Slide Image Placeholder 1"/>
-          <p:cNvSpPr>
-            <a:spLocks noGrp="1" noRot="1" noChangeAspect="1"/>
-          </p:cNvSpPr>
-          <p:nvPr>
-            <p:ph type="sldImg"/>
-          </p:nvPr>
-        </p:nvSpPr>
-        <p:spPr/>
-      </p:sp>
-      <p:sp>
-        <p:nvSpPr>
-          <p:cNvPr id="3" name="Notes Placeholder 2"/>
-          <p:cNvSpPr>
-            <a:spLocks noGrp="1"/>
-          </p:cNvSpPr>
-          <p:nvPr>
-            <p:ph type="body" idx="1"/>
-          </p:nvPr>
-        </p:nvSpPr>
-        <p:spPr/>
-        <p:txBody>
-          <a:bodyPr/>
-          <a:lstStyle/>
-          <a:p>
             <a:endParaRPr lang="en-US" dirty="0"/>
           </a:p>
         </p:txBody>
@@ -2458,7 +2260,7 @@
           <a:p>
             <a:fld id="{38EEC551-8CDA-4EB6-89BB-2A86C9F091C8}" type="datetime8">
               <a:rPr lang="en-US" smtClean="0"/>
-              <a:t>3/30/2016 10:51 AM</a:t>
+              <a:t>3/30/2016 9:39 PM</a:t>
             </a:fld>
             <a:endParaRPr lang="en-US" dirty="0"/>
           </a:p>
@@ -2664,7 +2466,7 @@
                 </a:solidFill>
               </a:rPr>
               <a:pPr/>
-              <a:t>3/30/2016 10:51 AM</a:t>
+              <a:t>3/30/2016 9:39 PM</a:t>
             </a:fld>
             <a:endParaRPr lang="en-US" dirty="0">
               <a:solidFill>
@@ -2841,7 +2643,7 @@
           <a:p>
             <a:fld id="{90EC29EE-A8AD-4CE0-9C0B-116E0D4D7533}" type="datetime8">
               <a:rPr lang="en-US" smtClean="0"/>
-              <a:t>3/30/2016 10:51 AM</a:t>
+              <a:t>3/30/2016 9:39 PM</a:t>
             </a:fld>
             <a:endParaRPr lang="en-US" dirty="0"/>
           </a:p>
@@ -3039,7 +2841,7 @@
                 </a:solidFill>
               </a:rPr>
               <a:pPr/>
-              <a:t>3/30/2016 10:51 AM</a:t>
+              <a:t>3/30/2016 9:39 PM</a:t>
             </a:fld>
             <a:endParaRPr lang="en-US" dirty="0">
               <a:solidFill>
@@ -3389,7 +3191,7 @@
           <a:p>
             <a:fld id="{90EC29EE-A8AD-4CE0-9C0B-116E0D4D7533}" type="datetime8">
               <a:rPr lang="en-US" smtClean="0"/>
-              <a:t>3/30/2016 10:51 AM</a:t>
+              <a:t>3/30/2016 9:39 PM</a:t>
             </a:fld>
             <a:endParaRPr lang="en-US" dirty="0"/>
           </a:p>
@@ -3899,7 +3701,7 @@
           <a:p>
             <a:fld id="{38EEC551-8CDA-4EB6-89BB-2A86C9F091C8}" type="datetime8">
               <a:rPr lang="en-US" smtClean="0"/>
-              <a:t>3/30/2016 10:51 AM</a:t>
+              <a:t>3/30/2016 9:54 PM</a:t>
             </a:fld>
             <a:endParaRPr lang="en-US" dirty="0"/>
           </a:p>
@@ -3932,7 +3734,7 @@
     </p:spTree>
     <p:extLst>
       <p:ext uri="{BB962C8B-B14F-4D97-AF65-F5344CB8AC3E}">
-        <p14:creationId xmlns:p14="http://schemas.microsoft.com/office/powerpoint/2010/main" val="3370971105"/>
+        <p14:creationId xmlns:p14="http://schemas.microsoft.com/office/powerpoint/2010/main" val="2316892694"/>
       </p:ext>
     </p:extLst>
   </p:cSld>
@@ -20296,7 +20098,7 @@
         <p:spPr>
           <a:xfrm>
             <a:off x="350836" y="3954463"/>
-            <a:ext cx="11277601" cy="1538883"/>
+            <a:ext cx="11506201" cy="1292662"/>
           </a:xfrm>
         </p:spPr>
         <p:txBody>
@@ -20307,8 +20109,8 @@
               <a:buNone/>
             </a:pPr>
             <a:r>
-              <a:rPr lang="en-US" sz="4400" dirty="0"/>
-              <a:t>Share your photos and experiences!</a:t>
+              <a:rPr lang="en-US" sz="3600" dirty="0"/>
+              <a:t>http://aka.ms/angle-hol</a:t>
             </a:r>
           </a:p>
           <a:p>
@@ -20316,109 +20118,14 @@
               <a:buNone/>
             </a:pPr>
             <a:r>
-              <a:rPr lang="en-US" sz="4400" dirty="0"/>
-              <a:t>#Build2016</a:t>
-            </a:r>
-          </a:p>
-        </p:txBody>
-      </p:sp>
-    </p:spTree>
-    <p:extLst>
-      <p:ext uri="{BB962C8B-B14F-4D97-AF65-F5344CB8AC3E}">
-        <p14:creationId xmlns:p14="http://schemas.microsoft.com/office/powerpoint/2010/main" val="3305032595"/>
-      </p:ext>
-    </p:extLst>
-  </p:cSld>
-  <p:clrMapOvr>
-    <a:masterClrMapping/>
-  </p:clrMapOvr>
-  <p:transition>
-    <p:fade/>
-  </p:transition>
-</p:sld>
-</file>
-
-<file path=ppt/slides/slide12.xml><?xml version="1.0" encoding="utf-8"?>
-<p:sld xmlns:a="http://schemas.openxmlformats.org/drawingml/2006/main" xmlns:r="http://schemas.openxmlformats.org/officeDocument/2006/relationships" xmlns:p="http://schemas.openxmlformats.org/presentationml/2006/main">
-  <p:cSld>
-    <p:spTree>
-      <p:nvGrpSpPr>
-        <p:cNvPr id="1" name=""/>
-        <p:cNvGrpSpPr/>
-        <p:nvPr/>
-      </p:nvGrpSpPr>
-      <p:grpSpPr>
-        <a:xfrm>
-          <a:off x="0" y="0"/>
-          <a:ext cx="0" cy="0"/>
-          <a:chOff x="0" y="0"/>
-          <a:chExt cx="0" cy="0"/>
-        </a:xfrm>
-      </p:grpSpPr>
-      <p:sp>
-        <p:nvSpPr>
-          <p:cNvPr id="4" name="Title 3"/>
-          <p:cNvSpPr>
-            <a:spLocks noGrp="1"/>
-          </p:cNvSpPr>
-          <p:nvPr>
-            <p:ph type="title"/>
-          </p:nvPr>
-        </p:nvSpPr>
-        <p:spPr>
-          <a:xfrm>
-            <a:off x="274638" y="1287462"/>
-            <a:ext cx="11887200" cy="1903400"/>
-          </a:xfrm>
-        </p:spPr>
-        <p:txBody>
-          <a:bodyPr/>
-          <a:lstStyle/>
-          <a:p>
-            <a:r>
-              <a:rPr lang="en-US" sz="11500" dirty="0"/>
-              <a:t>Lab</a:t>
-            </a:r>
-          </a:p>
-        </p:txBody>
-      </p:sp>
-      <p:sp>
-        <p:nvSpPr>
-          <p:cNvPr id="7" name="Text Placeholder 6"/>
-          <p:cNvSpPr>
-            <a:spLocks noGrp="1"/>
-          </p:cNvSpPr>
-          <p:nvPr>
-            <p:ph type="body" sz="quarter" idx="4294967295"/>
-          </p:nvPr>
-        </p:nvSpPr>
-        <p:spPr>
-          <a:xfrm>
-            <a:off x="350836" y="3954463"/>
-            <a:ext cx="11277601" cy="1538883"/>
-          </a:xfrm>
-        </p:spPr>
-        <p:txBody>
-          <a:bodyPr/>
-          <a:lstStyle/>
-          <a:p>
-            <a:pPr marL="0" indent="0">
-              <a:buNone/>
-            </a:pPr>
-            <a:r>
-              <a:rPr lang="en-US" sz="4400" dirty="0"/>
-              <a:t>http://aka.ms/angle-hol</a:t>
-            </a:r>
-          </a:p>
-          <a:p>
-            <a:pPr marL="0" indent="0">
-              <a:buNone/>
-            </a:pPr>
-            <a:r>
-              <a:rPr lang="en-US" sz="4400" dirty="0" err="1"/>
+              <a:rPr lang="en-US" sz="3600" dirty="0"/>
+              <a:t>CodeLabs-GameDev-3-ANGLE\</a:t>
+            </a:r>
+            <a:r>
+              <a:rPr lang="en-US" sz="3600" dirty="0" err="1"/>
               <a:t>ANGLE.shortcut</a:t>
             </a:r>
-            <a:endParaRPr lang="en-US" sz="4400" dirty="0"/>
+            <a:endParaRPr lang="en-US" sz="3600" dirty="0"/>
           </a:p>
         </p:txBody>
       </p:sp>
@@ -20438,7 +20145,7 @@
 </p:sld>
 </file>
 
-<file path=ppt/slides/slide13.xml><?xml version="1.0" encoding="utf-8"?>
+<file path=ppt/slides/slide12.xml><?xml version="1.0" encoding="utf-8"?>
 <p:sld xmlns:a="http://schemas.openxmlformats.org/drawingml/2006/main" xmlns:r="http://schemas.openxmlformats.org/officeDocument/2006/relationships" xmlns:p="http://schemas.openxmlformats.org/presentationml/2006/main">
   <p:cSld>
     <p:spTree>
@@ -21171,26 +20878,37 @@
         </p:nvSpPr>
         <p:spPr>
           <a:xfrm>
-            <a:off x="4117663" y="3266431"/>
-            <a:ext cx="4201150" cy="461665"/>
+            <a:off x="1965960" y="3266431"/>
+            <a:ext cx="9586277" cy="1477328"/>
           </a:xfrm>
           <a:prstGeom prst="rect">
             <a:avLst/>
           </a:prstGeom>
         </p:spPr>
         <p:txBody>
-          <a:bodyPr wrap="none">
+          <a:bodyPr wrap="square">
             <a:spAutoFit/>
           </a:bodyPr>
           <a:lstStyle/>
           <a:p>
-            <a:pPr lvl="1"/>
             <a:r>
               <a:rPr lang="en-US" sz="2400" b="1" dirty="0">
                 <a:hlinkClick r:id="rId3"/>
               </a:rPr>
               <a:t>http://aka.ms/angle-ex1</a:t>
             </a:r>
+            <a:endParaRPr lang="en-US" sz="2400" b="1" dirty="0"/>
+          </a:p>
+          <a:p>
+            <a:endParaRPr lang="en-US" sz="2400" b="1" dirty="0"/>
+          </a:p>
+          <a:p>
+            <a:r>
+              <a:rPr lang="en-US" sz="2400" dirty="0"/>
+              <a:t>CodeLabs-GameDev-3-ANGLE\Source\Ex1\Ex1.shortcut</a:t>
+            </a:r>
+          </a:p>
+          <a:p>
             <a:endParaRPr lang="en-US" dirty="0"/>
           </a:p>
         </p:txBody>
@@ -21213,6 +20931,146 @@
       <p:transition/>
     </mc:Fallback>
   </mc:AlternateContent>
+</p:sld>
+</file>
+
+<file path=ppt/slides/slide13.xml><?xml version="1.0" encoding="utf-8"?>
+<p:sld xmlns:a="http://schemas.openxmlformats.org/drawingml/2006/main" xmlns:r="http://schemas.openxmlformats.org/officeDocument/2006/relationships" xmlns:p="http://schemas.openxmlformats.org/presentationml/2006/main">
+  <p:cSld>
+    <p:spTree>
+      <p:nvGrpSpPr>
+        <p:cNvPr id="1" name=""/>
+        <p:cNvGrpSpPr/>
+        <p:nvPr/>
+      </p:nvGrpSpPr>
+      <p:grpSpPr>
+        <a:xfrm>
+          <a:off x="0" y="0"/>
+          <a:ext cx="0" cy="0"/>
+          <a:chOff x="0" y="0"/>
+          <a:chExt cx="0" cy="0"/>
+        </a:xfrm>
+      </p:grpSpPr>
+      <p:sp>
+        <p:nvSpPr>
+          <p:cNvPr id="2" name="Title 1"/>
+          <p:cNvSpPr>
+            <a:spLocks noGrp="1"/>
+          </p:cNvSpPr>
+          <p:nvPr>
+            <p:ph type="title"/>
+          </p:nvPr>
+        </p:nvSpPr>
+        <p:spPr>
+          <a:xfrm>
+            <a:off x="274639" y="295274"/>
+            <a:ext cx="4419598" cy="917575"/>
+          </a:xfrm>
+        </p:spPr>
+        <p:txBody>
+          <a:bodyPr/>
+          <a:lstStyle/>
+          <a:p>
+            <a:r>
+              <a:rPr lang="en-US" dirty="0"/>
+              <a:t>ANGLE Project</a:t>
+            </a:r>
+          </a:p>
+        </p:txBody>
+      </p:sp>
+      <p:sp>
+        <p:nvSpPr>
+          <p:cNvPr id="3" name="Text Placeholder 2"/>
+          <p:cNvSpPr>
+            <a:spLocks noGrp="1"/>
+          </p:cNvSpPr>
+          <p:nvPr>
+            <p:ph type="body" sz="quarter" idx="10"/>
+          </p:nvPr>
+        </p:nvSpPr>
+        <p:spPr>
+          <a:xfrm>
+            <a:off x="274639" y="1287462"/>
+            <a:ext cx="4952999" cy="3877985"/>
+          </a:xfrm>
+        </p:spPr>
+        <p:txBody>
+          <a:bodyPr/>
+          <a:lstStyle/>
+          <a:p>
+            <a:r>
+              <a:rPr lang="en-US" sz="3200" dirty="0" err="1"/>
+              <a:t>App.xaml</a:t>
+            </a:r>
+            <a:endParaRPr lang="en-US" sz="3200" dirty="0"/>
+          </a:p>
+          <a:p>
+            <a:endParaRPr lang="en-US" sz="3200" dirty="0"/>
+          </a:p>
+          <a:p>
+            <a:r>
+              <a:rPr lang="en-US" sz="3200" dirty="0" err="1"/>
+              <a:t>OpenGLESPage</a:t>
+            </a:r>
+            <a:endParaRPr lang="en-US" sz="3200" dirty="0"/>
+          </a:p>
+          <a:p>
+            <a:endParaRPr lang="en-US" sz="3200" dirty="0"/>
+          </a:p>
+          <a:p>
+            <a:r>
+              <a:rPr lang="en-US" sz="3200" dirty="0"/>
+              <a:t>OpenGLES.cpp</a:t>
+            </a:r>
+          </a:p>
+          <a:p>
+            <a:endParaRPr lang="en-US" sz="3200" dirty="0"/>
+          </a:p>
+          <a:p>
+            <a:r>
+              <a:rPr lang="en-US" sz="3200" dirty="0"/>
+              <a:t>SimpleRenderer.cpp</a:t>
+            </a:r>
+          </a:p>
+        </p:txBody>
+      </p:sp>
+      <p:pic>
+        <p:nvPicPr>
+          <p:cNvPr id="5" name="Picture 4"/>
+          <p:cNvPicPr>
+            <a:picLocks noChangeAspect="1"/>
+          </p:cNvPicPr>
+          <p:nvPr/>
+        </p:nvPicPr>
+        <p:blipFill>
+          <a:blip r:embed="rId2"/>
+          <a:stretch>
+            <a:fillRect/>
+          </a:stretch>
+        </p:blipFill>
+        <p:spPr>
+          <a:xfrm>
+            <a:off x="5684837" y="373062"/>
+            <a:ext cx="5305425" cy="6057900"/>
+          </a:xfrm>
+          <a:prstGeom prst="rect">
+            <a:avLst/>
+          </a:prstGeom>
+        </p:spPr>
+      </p:pic>
+    </p:spTree>
+    <p:extLst>
+      <p:ext uri="{BB962C8B-B14F-4D97-AF65-F5344CB8AC3E}">
+        <p14:creationId xmlns:p14="http://schemas.microsoft.com/office/powerpoint/2010/main" val="362378448"/>
+      </p:ext>
+    </p:extLst>
+  </p:cSld>
+  <p:clrMapOvr>
+    <a:masterClrMapping/>
+  </p:clrMapOvr>
+  <p:transition>
+    <p:fade/>
+  </p:transition>
 </p:sld>
 </file>
 
@@ -21970,27 +21828,35 @@
         </p:nvSpPr>
         <p:spPr>
           <a:xfrm>
-            <a:off x="4117663" y="3266431"/>
-            <a:ext cx="4201150" cy="461665"/>
+            <a:off x="1968859" y="3266431"/>
+            <a:ext cx="7968667" cy="1200329"/>
           </a:xfrm>
           <a:prstGeom prst="rect">
             <a:avLst/>
           </a:prstGeom>
         </p:spPr>
         <p:txBody>
-          <a:bodyPr wrap="none">
+          <a:bodyPr wrap="square">
             <a:spAutoFit/>
           </a:bodyPr>
           <a:lstStyle/>
           <a:p>
-            <a:pPr lvl="1"/>
             <a:r>
               <a:rPr lang="en-US" sz="2400" b="1" dirty="0">
                 <a:hlinkClick r:id="rId3"/>
               </a:rPr>
               <a:t>http://aka.ms/angle-ex2</a:t>
             </a:r>
-            <a:endParaRPr lang="en-US" dirty="0"/>
+            <a:endParaRPr lang="en-US" sz="2400" b="1" dirty="0"/>
+          </a:p>
+          <a:p>
+            <a:endParaRPr lang="en-US" sz="2400" b="1" dirty="0"/>
+          </a:p>
+          <a:p>
+            <a:r>
+              <a:rPr lang="en-US" sz="2400" dirty="0"/>
+              <a:t>CodeLabs-GameDev-3-ANGLE\Source\Ex2\Ex2.shortcut</a:t>
+            </a:r>
           </a:p>
         </p:txBody>
       </p:sp>
@@ -22040,7 +21906,7 @@
         </p:nvSpPr>
         <p:spPr bwMode="auto">
           <a:xfrm>
-            <a:off x="-175159" y="1557463"/>
+            <a:off x="1764" y="1551180"/>
             <a:ext cx="12434711" cy="5298882"/>
           </a:xfrm>
           <a:prstGeom prst="rect">
@@ -22769,27 +22635,35 @@
         </p:nvSpPr>
         <p:spPr>
           <a:xfrm>
-            <a:off x="4117663" y="3266431"/>
-            <a:ext cx="4201150" cy="461665"/>
+            <a:off x="1968859" y="3266431"/>
+            <a:ext cx="9507178" cy="1200329"/>
           </a:xfrm>
           <a:prstGeom prst="rect">
             <a:avLst/>
           </a:prstGeom>
         </p:spPr>
         <p:txBody>
-          <a:bodyPr wrap="none">
+          <a:bodyPr wrap="square">
             <a:spAutoFit/>
           </a:bodyPr>
           <a:lstStyle/>
           <a:p>
-            <a:pPr lvl="1"/>
             <a:r>
               <a:rPr lang="en-US" sz="2400" b="1" dirty="0">
                 <a:hlinkClick r:id="rId3"/>
               </a:rPr>
               <a:t>http://aka.ms/angle-ex3</a:t>
             </a:r>
-            <a:endParaRPr lang="en-US" dirty="0"/>
+            <a:endParaRPr lang="en-US" sz="2400" b="1" dirty="0"/>
+          </a:p>
+          <a:p>
+            <a:endParaRPr lang="en-US" sz="2400" b="1" dirty="0"/>
+          </a:p>
+          <a:p>
+            <a:r>
+              <a:rPr lang="en-US" sz="2400" dirty="0"/>
+              <a:t>CodeLabs-GameDev-3-ANGLE\Source\Ex3\Ex3.shortcut</a:t>
+            </a:r>
           </a:p>
         </p:txBody>
       </p:sp>
@@ -22839,7 +22713,7 @@
         </p:nvSpPr>
         <p:spPr bwMode="auto">
           <a:xfrm>
-            <a:off x="882" y="1547274"/>
+            <a:off x="0" y="1551180"/>
             <a:ext cx="12434711" cy="5298882"/>
           </a:xfrm>
           <a:prstGeom prst="rect">
@@ -23568,27 +23442,35 @@
         </p:nvSpPr>
         <p:spPr>
           <a:xfrm>
-            <a:off x="4117663" y="3266431"/>
-            <a:ext cx="4201150" cy="461665"/>
+            <a:off x="1968858" y="3266431"/>
+            <a:ext cx="9586277" cy="1200329"/>
           </a:xfrm>
           <a:prstGeom prst="rect">
             <a:avLst/>
           </a:prstGeom>
         </p:spPr>
         <p:txBody>
-          <a:bodyPr wrap="none">
+          <a:bodyPr wrap="square">
             <a:spAutoFit/>
           </a:bodyPr>
           <a:lstStyle/>
           <a:p>
-            <a:pPr lvl="1"/>
             <a:r>
               <a:rPr lang="en-US" sz="2400" b="1" dirty="0">
                 <a:hlinkClick r:id="rId3"/>
               </a:rPr>
               <a:t>http://aka.ms/angle-ex4</a:t>
             </a:r>
-            <a:endParaRPr lang="en-US" dirty="0"/>
+            <a:endParaRPr lang="en-US" sz="2400" b="1" dirty="0"/>
+          </a:p>
+          <a:p>
+            <a:endParaRPr lang="en-US" sz="2400" b="1" dirty="0"/>
+          </a:p>
+          <a:p>
+            <a:r>
+              <a:rPr lang="en-US" sz="2400" dirty="0"/>
+              <a:t>CodeLabs-GameDev-3-ANGLE\Source\Ex4\Ex4.shortcut</a:t>
+            </a:r>
           </a:p>
         </p:txBody>
       </p:sp>
@@ -23679,10 +23561,9 @@
           <a:p>
             <a:pPr lvl="1"/>
             <a:r>
-              <a:rPr lang="en-US"/>
+              <a:rPr lang="en-US" dirty="0"/>
               <a:t>https://github.com/Microsoft-Build-2016/CodeLabs-GameDev-3-ANGLE/blob/master/Source/Ex4/README.md</a:t>
             </a:r>
-            <a:endParaRPr lang="en-US" dirty="0"/>
           </a:p>
         </p:txBody>
       </p:sp>
@@ -24355,26 +24236,37 @@
         </p:nvSpPr>
         <p:spPr>
           <a:xfrm>
-            <a:off x="4117663" y="3266431"/>
-            <a:ext cx="4201150" cy="461665"/>
+            <a:off x="1965960" y="3266431"/>
+            <a:ext cx="9586277" cy="1477328"/>
           </a:xfrm>
           <a:prstGeom prst="rect">
             <a:avLst/>
           </a:prstGeom>
         </p:spPr>
         <p:txBody>
-          <a:bodyPr wrap="none">
+          <a:bodyPr wrap="square">
             <a:spAutoFit/>
           </a:bodyPr>
           <a:lstStyle/>
           <a:p>
-            <a:pPr lvl="1"/>
             <a:r>
               <a:rPr lang="en-US" sz="2400" b="1" dirty="0">
                 <a:hlinkClick r:id="rId3"/>
               </a:rPr>
               <a:t>http://aka.ms/angle-ex7</a:t>
             </a:r>
+            <a:endParaRPr lang="en-US" sz="2400" b="1" dirty="0"/>
+          </a:p>
+          <a:p>
+            <a:endParaRPr lang="en-US" sz="2400" b="1" dirty="0"/>
+          </a:p>
+          <a:p>
+            <a:r>
+              <a:rPr lang="en-US" sz="2400" dirty="0"/>
+              <a:t>CodeLabs-GameDev-3-ANGLE\Source\Ex7\Ex7.shortcut</a:t>
+            </a:r>
+          </a:p>
+          <a:p>
             <a:endParaRPr lang="en-US" dirty="0"/>
           </a:p>
         </p:txBody>
@@ -25982,6 +25874,12 @@
             <a:r>
               <a:rPr lang="en-US" dirty="0"/>
               <a:t>Senior Software Engineer</a:t>
+            </a:r>
+          </a:p>
+          <a:p>
+            <a:r>
+              <a:rPr lang="en-US" dirty="0"/>
+              <a:t>dalestam@microsoft.com</a:t>
             </a:r>
           </a:p>
         </p:txBody>
@@ -34457,6 +34355,12 @@
 </file>
 
 <file path=customXml/item1.xml><?xml version="1.0" encoding="utf-8"?>
+<p:properties xmlns:p="http://schemas.microsoft.com/office/2006/metadata/properties" xmlns:xsi="http://www.w3.org/2001/XMLSchema-instance" xmlns:pc="http://schemas.microsoft.com/office/infopath/2007/PartnerControls">
+  <documentManagement/>
+</p:properties>
+</file>
+
+<file path=customXml/item2.xml><?xml version="1.0" encoding="utf-8"?>
 <ct:contentTypeSchema xmlns:ct="http://schemas.microsoft.com/office/2006/metadata/contentType" xmlns:ma="http://schemas.microsoft.com/office/2006/metadata/properties/metaAttributes" ct:_="" ma:_="" ma:contentTypeName="Document" ma:contentTypeID="0x010100F50271A20F7B3C41B827A8F04D548019" ma:contentTypeVersion="2" ma:contentTypeDescription="Create a new document." ma:contentTypeScope="" ma:versionID="0f5b4adeca3fa452dfd663ff4e0777e3">
   <xsd:schema xmlns:xsd="http://www.w3.org/2001/XMLSchema" xmlns:xs="http://www.w3.org/2001/XMLSchema" xmlns:p="http://schemas.microsoft.com/office/2006/metadata/properties" xmlns:ns2="f85c541c-390e-4fa8-b262-5da5c5cfad75" targetNamespace="http://schemas.microsoft.com/office/2006/metadata/properties" ma:root="true" ma:fieldsID="592d4a22e1cc7090506e0998bb31d05e" ns2:_="">
     <xsd:import namespace="f85c541c-390e-4fa8-b262-5da5c5cfad75"/>
@@ -34604,12 +34508,6 @@
 </ct:contentTypeSchema>
 </file>
 
-<file path=customXml/item2.xml><?xml version="1.0" encoding="utf-8"?>
-<p:properties xmlns:p="http://schemas.microsoft.com/office/2006/metadata/properties" xmlns:xsi="http://www.w3.org/2001/XMLSchema-instance" xmlns:pc="http://schemas.microsoft.com/office/infopath/2007/PartnerControls">
-  <documentManagement/>
-</p:properties>
-</file>
-
 <file path=customXml/item3.xml><?xml version="1.0" encoding="utf-8"?>
 <?mso-contentType ?>
 <FormTemplates xmlns="http://schemas.microsoft.com/sharepoint/v3/contenttype/forms">
@@ -34620,6 +34518,22 @@
 </file>
 
 <file path=customXml/itemProps1.xml><?xml version="1.0" encoding="utf-8"?>
+<ds:datastoreItem xmlns:ds="http://schemas.openxmlformats.org/officeDocument/2006/customXml" ds:itemID="{F990F116-B58F-4255-B05B-DA3808E0E5C6}">
+  <ds:schemaRefs>
+    <ds:schemaRef ds:uri="http://purl.org/dc/terms/"/>
+    <ds:schemaRef ds:uri="http://schemas.openxmlformats.org/package/2006/metadata/core-properties"/>
+    <ds:schemaRef ds:uri="http://schemas.microsoft.com/office/2006/documentManagement/types"/>
+    <ds:schemaRef ds:uri="http://schemas.microsoft.com/office/infopath/2007/PartnerControls"/>
+    <ds:schemaRef ds:uri="http://purl.org/dc/elements/1.1/"/>
+    <ds:schemaRef ds:uri="http://schemas.microsoft.com/office/2006/metadata/properties"/>
+    <ds:schemaRef ds:uri="f85c541c-390e-4fa8-b262-5da5c5cfad75"/>
+    <ds:schemaRef ds:uri="http://www.w3.org/XML/1998/namespace"/>
+    <ds:schemaRef ds:uri="http://purl.org/dc/dcmitype/"/>
+  </ds:schemaRefs>
+</ds:datastoreItem>
+</file>
+
+<file path=customXml/itemProps2.xml><?xml version="1.0" encoding="utf-8"?>
 <ds:datastoreItem xmlns:ds="http://schemas.openxmlformats.org/officeDocument/2006/customXml" ds:itemID="{16C79B61-263D-4889-954E-B7F93FBE6617}">
   <ds:schemaRefs>
     <ds:schemaRef ds:uri="http://schemas.microsoft.com/office/2006/metadata/contentType"/>
@@ -34637,22 +34551,6 @@
 </ds:datastoreItem>
 </file>
 
-<file path=customXml/itemProps2.xml><?xml version="1.0" encoding="utf-8"?>
-<ds:datastoreItem xmlns:ds="http://schemas.openxmlformats.org/officeDocument/2006/customXml" ds:itemID="{F990F116-B58F-4255-B05B-DA3808E0E5C6}">
-  <ds:schemaRefs>
-    <ds:schemaRef ds:uri="http://purl.org/dc/terms/"/>
-    <ds:schemaRef ds:uri="http://schemas.openxmlformats.org/package/2006/metadata/core-properties"/>
-    <ds:schemaRef ds:uri="http://schemas.microsoft.com/office/2006/documentManagement/types"/>
-    <ds:schemaRef ds:uri="http://schemas.microsoft.com/office/infopath/2007/PartnerControls"/>
-    <ds:schemaRef ds:uri="http://purl.org/dc/elements/1.1/"/>
-    <ds:schemaRef ds:uri="http://schemas.microsoft.com/office/2006/metadata/properties"/>
-    <ds:schemaRef ds:uri="f85c541c-390e-4fa8-b262-5da5c5cfad75"/>
-    <ds:schemaRef ds:uri="http://www.w3.org/XML/1998/namespace"/>
-    <ds:schemaRef ds:uri="http://purl.org/dc/dcmitype/"/>
-  </ds:schemaRefs>
-</ds:datastoreItem>
-</file>
-
 <file path=customXml/itemProps3.xml><?xml version="1.0" encoding="utf-8"?>
 <ds:datastoreItem xmlns:ds="http://schemas.openxmlformats.org/officeDocument/2006/customXml" ds:itemID="{758FDAC0-319D-4A54-8D8E-1D42CB1F8004}">
   <ds:schemaRefs>

</xml_diff>

<commit_message>
added Breakout game slide
</commit_message>
<xml_diff>
--- a/Presentation.pptx
+++ b/Presentation.pptx
@@ -6,10 +6,10 @@
     <p:sldMasterId id="2147484310" r:id="rId5"/>
   </p:sldMasterIdLst>
   <p:notesMasterIdLst>
-    <p:notesMasterId r:id="rId27"/>
+    <p:notesMasterId r:id="rId29"/>
   </p:notesMasterIdLst>
   <p:handoutMasterIdLst>
-    <p:handoutMasterId r:id="rId28"/>
+    <p:handoutMasterId r:id="rId30"/>
   </p:handoutMasterIdLst>
   <p:sldIdLst>
     <p:sldId id="1444" r:id="rId6"/>
@@ -23,16 +23,18 @@
     <p:sldId id="1459" r:id="rId14"/>
     <p:sldId id="1470" r:id="rId15"/>
     <p:sldId id="1479" r:id="rId16"/>
-    <p:sldId id="1473" r:id="rId17"/>
-    <p:sldId id="1480" r:id="rId18"/>
-    <p:sldId id="1474" r:id="rId19"/>
-    <p:sldId id="1475" r:id="rId20"/>
-    <p:sldId id="1476" r:id="rId21"/>
-    <p:sldId id="1477" r:id="rId22"/>
-    <p:sldId id="1462" r:id="rId23"/>
-    <p:sldId id="1472" r:id="rId24"/>
-    <p:sldId id="1464" r:id="rId25"/>
-    <p:sldId id="1466" r:id="rId26"/>
+    <p:sldId id="1481" r:id="rId17"/>
+    <p:sldId id="1473" r:id="rId18"/>
+    <p:sldId id="1480" r:id="rId19"/>
+    <p:sldId id="1474" r:id="rId20"/>
+    <p:sldId id="1475" r:id="rId21"/>
+    <p:sldId id="1476" r:id="rId22"/>
+    <p:sldId id="1477" r:id="rId23"/>
+    <p:sldId id="1462" r:id="rId24"/>
+    <p:sldId id="1482" r:id="rId25"/>
+    <p:sldId id="1472" r:id="rId26"/>
+    <p:sldId id="1464" r:id="rId27"/>
+    <p:sldId id="1466" r:id="rId28"/>
   </p:sldIdLst>
   <p:sldSz cx="12436475" cy="6994525"/>
   <p:notesSz cx="6858000" cy="9144000"/>
@@ -1097,7 +1099,7 @@
                 <a:tabLst/>
                 <a:defRPr/>
               </a:pPr>
-              <a:t>12</a:t>
+              <a:t>13</a:t>
             </a:fld>
             <a:endParaRPr kumimoji="0" lang="en-US" sz="1200" b="0" i="0" u="none" strike="noStrike" kern="1200" cap="none" spc="0" normalizeH="0" baseline="0" noProof="0">
               <a:ln>
@@ -1130,162 +1132,6 @@
 </file>
 
 <file path=ppt/notesSlides/notesSlide11.xml><?xml version="1.0" encoding="utf-8"?>
-<p:notes xmlns:a="http://schemas.openxmlformats.org/drawingml/2006/main" xmlns:r="http://schemas.openxmlformats.org/officeDocument/2006/relationships" xmlns:p="http://schemas.openxmlformats.org/presentationml/2006/main">
-  <p:cSld>
-    <p:spTree>
-      <p:nvGrpSpPr>
-        <p:cNvPr id="1" name=""/>
-        <p:cNvGrpSpPr/>
-        <p:nvPr/>
-      </p:nvGrpSpPr>
-      <p:grpSpPr>
-        <a:xfrm>
-          <a:off x="0" y="0"/>
-          <a:ext cx="0" cy="0"/>
-          <a:chOff x="0" y="0"/>
-          <a:chExt cx="0" cy="0"/>
-        </a:xfrm>
-      </p:grpSpPr>
-      <p:sp>
-        <p:nvSpPr>
-          <p:cNvPr id="2" name="Slide Image Placeholder 1"/>
-          <p:cNvSpPr>
-            <a:spLocks noGrp="1" noRot="1" noChangeAspect="1"/>
-          </p:cNvSpPr>
-          <p:nvPr>
-            <p:ph type="sldImg"/>
-          </p:nvPr>
-        </p:nvSpPr>
-        <p:spPr/>
-      </p:sp>
-      <p:sp>
-        <p:nvSpPr>
-          <p:cNvPr id="3" name="Notes Placeholder 2"/>
-          <p:cNvSpPr>
-            <a:spLocks noGrp="1"/>
-          </p:cNvSpPr>
-          <p:nvPr>
-            <p:ph type="body" idx="1"/>
-          </p:nvPr>
-        </p:nvSpPr>
-        <p:spPr/>
-        <p:txBody>
-          <a:bodyPr/>
-          <a:lstStyle/>
-          <a:p>
-            <a:r>
-              <a:rPr lang="en-US" baseline="0" dirty="0"/>
-              <a:t>“As a follow-on to this lab, we also have the Azure IoT lab. In that, you’ll learn how to use the Raspberry Pi to send sensor data to IoT Hub and process it using other Azure IoT services.</a:t>
-            </a:r>
-          </a:p>
-          <a:p>
-            <a:endParaRPr lang="en-US" baseline="0" dirty="0"/>
-          </a:p>
-          <a:p>
-            <a:r>
-              <a:rPr lang="en-US" baseline="0" dirty="0"/>
-              <a:t>If you are interested in the underlying IO and other capabilities on devices like the Raspberry Pi, or want to explore more with Azure and devices, we also have the Open Hack in this same room, starting on Day 2.”</a:t>
-            </a:r>
-          </a:p>
-        </p:txBody>
-      </p:sp>
-      <p:sp>
-        <p:nvSpPr>
-          <p:cNvPr id="4" name="Slide Number Placeholder 3"/>
-          <p:cNvSpPr>
-            <a:spLocks noGrp="1"/>
-          </p:cNvSpPr>
-          <p:nvPr>
-            <p:ph type="sldNum" sz="quarter" idx="10"/>
-          </p:nvPr>
-        </p:nvSpPr>
-        <p:spPr/>
-        <p:txBody>
-          <a:bodyPr/>
-          <a:lstStyle/>
-          <a:p>
-            <a:pPr marL="0" marR="0" lvl="0" indent="0" algn="r" defTabSz="914400" rtl="0" eaLnBrk="1" fontAlgn="auto" latinLnBrk="0" hangingPunct="1">
-              <a:lnSpc>
-                <a:spcPct val="100000"/>
-              </a:lnSpc>
-              <a:spcBef>
-                <a:spcPts val="0"/>
-              </a:spcBef>
-              <a:spcAft>
-                <a:spcPts val="0"/>
-              </a:spcAft>
-              <a:buClrTx/>
-              <a:buSzTx/>
-              <a:buFontTx/>
-              <a:buNone/>
-              <a:tabLst/>
-              <a:defRPr/>
-            </a:pPr>
-            <a:fld id="{0EA2900F-B82C-4F11-85DB-97B88AAD310C}" type="slidenum">
-              <a:rPr kumimoji="0" lang="en-US" sz="1200" b="0" i="0" u="none" strike="noStrike" kern="1200" cap="none" spc="0" normalizeH="0" baseline="0" noProof="0" smtClean="0">
-                <a:ln>
-                  <a:noFill/>
-                </a:ln>
-                <a:solidFill>
-                  <a:prstClr val="black"/>
-                </a:solidFill>
-                <a:effectLst/>
-                <a:uLnTx/>
-                <a:uFillTx/>
-                <a:latin typeface="Calibri" panose="020F0502020204030204"/>
-                <a:ea typeface="+mn-ea"/>
-                <a:cs typeface="+mn-cs"/>
-              </a:rPr>
-              <a:pPr marL="0" marR="0" lvl="0" indent="0" algn="r" defTabSz="914400" rtl="0" eaLnBrk="1" fontAlgn="auto" latinLnBrk="0" hangingPunct="1">
-                <a:lnSpc>
-                  <a:spcPct val="100000"/>
-                </a:lnSpc>
-                <a:spcBef>
-                  <a:spcPts val="0"/>
-                </a:spcBef>
-                <a:spcAft>
-                  <a:spcPts val="0"/>
-                </a:spcAft>
-                <a:buClrTx/>
-                <a:buSzTx/>
-                <a:buFontTx/>
-                <a:buNone/>
-                <a:tabLst/>
-                <a:defRPr/>
-              </a:pPr>
-              <a:t>14</a:t>
-            </a:fld>
-            <a:endParaRPr kumimoji="0" lang="en-US" sz="1200" b="0" i="0" u="none" strike="noStrike" kern="1200" cap="none" spc="0" normalizeH="0" baseline="0" noProof="0">
-              <a:ln>
-                <a:noFill/>
-              </a:ln>
-              <a:solidFill>
-                <a:prstClr val="black"/>
-              </a:solidFill>
-              <a:effectLst/>
-              <a:uLnTx/>
-              <a:uFillTx/>
-              <a:latin typeface="Calibri" panose="020F0502020204030204"/>
-              <a:ea typeface="+mn-ea"/>
-              <a:cs typeface="+mn-cs"/>
-            </a:endParaRPr>
-          </a:p>
-        </p:txBody>
-      </p:sp>
-    </p:spTree>
-    <p:extLst>
-      <p:ext uri="{BB962C8B-B14F-4D97-AF65-F5344CB8AC3E}">
-        <p14:creationId xmlns:p14="http://schemas.microsoft.com/office/powerpoint/2010/main" val="2632193079"/>
-      </p:ext>
-    </p:extLst>
-  </p:cSld>
-  <p:clrMapOvr>
-    <a:masterClrMapping/>
-  </p:clrMapOvr>
-</p:notes>
-</file>
-
-<file path=ppt/notesSlides/notesSlide12.xml><?xml version="1.0" encoding="utf-8"?>
 <p:notes xmlns:a="http://schemas.openxmlformats.org/drawingml/2006/main" xmlns:r="http://schemas.openxmlformats.org/officeDocument/2006/relationships" xmlns:p="http://schemas.openxmlformats.org/presentationml/2006/main">
   <p:cSld>
     <p:spTree>
@@ -1431,7 +1277,7 @@
     </p:spTree>
     <p:extLst>
       <p:ext uri="{BB962C8B-B14F-4D97-AF65-F5344CB8AC3E}">
-        <p14:creationId xmlns:p14="http://schemas.microsoft.com/office/powerpoint/2010/main" val="1539370369"/>
+        <p14:creationId xmlns:p14="http://schemas.microsoft.com/office/powerpoint/2010/main" val="2632193079"/>
       </p:ext>
     </p:extLst>
   </p:cSld>
@@ -1441,7 +1287,7 @@
 </p:notes>
 </file>
 
-<file path=ppt/notesSlides/notesSlide13.xml><?xml version="1.0" encoding="utf-8"?>
+<file path=ppt/notesSlides/notesSlide12.xml><?xml version="1.0" encoding="utf-8"?>
 <p:notes xmlns:a="http://schemas.openxmlformats.org/drawingml/2006/main" xmlns:r="http://schemas.openxmlformats.org/officeDocument/2006/relationships" xmlns:p="http://schemas.openxmlformats.org/presentationml/2006/main">
   <p:cSld>
     <p:spTree>
@@ -1587,7 +1433,7 @@
     </p:spTree>
     <p:extLst>
       <p:ext uri="{BB962C8B-B14F-4D97-AF65-F5344CB8AC3E}">
-        <p14:creationId xmlns:p14="http://schemas.microsoft.com/office/powerpoint/2010/main" val="2944547330"/>
+        <p14:creationId xmlns:p14="http://schemas.microsoft.com/office/powerpoint/2010/main" val="1539370369"/>
       </p:ext>
     </p:extLst>
   </p:cSld>
@@ -1597,7 +1443,7 @@
 </p:notes>
 </file>
 
-<file path=ppt/notesSlides/notesSlide14.xml><?xml version="1.0" encoding="utf-8"?>
+<file path=ppt/notesSlides/notesSlide13.xml><?xml version="1.0" encoding="utf-8"?>
 <p:notes xmlns:a="http://schemas.openxmlformats.org/drawingml/2006/main" xmlns:r="http://schemas.openxmlformats.org/officeDocument/2006/relationships" xmlns:p="http://schemas.openxmlformats.org/presentationml/2006/main">
   <p:cSld>
     <p:spTree>
@@ -1743,6 +1589,162 @@
     </p:spTree>
     <p:extLst>
       <p:ext uri="{BB962C8B-B14F-4D97-AF65-F5344CB8AC3E}">
+        <p14:creationId xmlns:p14="http://schemas.microsoft.com/office/powerpoint/2010/main" val="2944547330"/>
+      </p:ext>
+    </p:extLst>
+  </p:cSld>
+  <p:clrMapOvr>
+    <a:masterClrMapping/>
+  </p:clrMapOvr>
+</p:notes>
+</file>
+
+<file path=ppt/notesSlides/notesSlide14.xml><?xml version="1.0" encoding="utf-8"?>
+<p:notes xmlns:a="http://schemas.openxmlformats.org/drawingml/2006/main" xmlns:r="http://schemas.openxmlformats.org/officeDocument/2006/relationships" xmlns:p="http://schemas.openxmlformats.org/presentationml/2006/main">
+  <p:cSld>
+    <p:spTree>
+      <p:nvGrpSpPr>
+        <p:cNvPr id="1" name=""/>
+        <p:cNvGrpSpPr/>
+        <p:nvPr/>
+      </p:nvGrpSpPr>
+      <p:grpSpPr>
+        <a:xfrm>
+          <a:off x="0" y="0"/>
+          <a:ext cx="0" cy="0"/>
+          <a:chOff x="0" y="0"/>
+          <a:chExt cx="0" cy="0"/>
+        </a:xfrm>
+      </p:grpSpPr>
+      <p:sp>
+        <p:nvSpPr>
+          <p:cNvPr id="2" name="Slide Image Placeholder 1"/>
+          <p:cNvSpPr>
+            <a:spLocks noGrp="1" noRot="1" noChangeAspect="1"/>
+          </p:cNvSpPr>
+          <p:nvPr>
+            <p:ph type="sldImg"/>
+          </p:nvPr>
+        </p:nvSpPr>
+        <p:spPr/>
+      </p:sp>
+      <p:sp>
+        <p:nvSpPr>
+          <p:cNvPr id="3" name="Notes Placeholder 2"/>
+          <p:cNvSpPr>
+            <a:spLocks noGrp="1"/>
+          </p:cNvSpPr>
+          <p:nvPr>
+            <p:ph type="body" idx="1"/>
+          </p:nvPr>
+        </p:nvSpPr>
+        <p:spPr/>
+        <p:txBody>
+          <a:bodyPr/>
+          <a:lstStyle/>
+          <a:p>
+            <a:r>
+              <a:rPr lang="en-US" baseline="0" dirty="0"/>
+              <a:t>“As a follow-on to this lab, we also have the Azure IoT lab. In that, you’ll learn how to use the Raspberry Pi to send sensor data to IoT Hub and process it using other Azure IoT services.</a:t>
+            </a:r>
+          </a:p>
+          <a:p>
+            <a:endParaRPr lang="en-US" baseline="0" dirty="0"/>
+          </a:p>
+          <a:p>
+            <a:r>
+              <a:rPr lang="en-US" baseline="0" dirty="0"/>
+              <a:t>If you are interested in the underlying IO and other capabilities on devices like the Raspberry Pi, or want to explore more with Azure and devices, we also have the Open Hack in this same room, starting on Day 2.”</a:t>
+            </a:r>
+          </a:p>
+        </p:txBody>
+      </p:sp>
+      <p:sp>
+        <p:nvSpPr>
+          <p:cNvPr id="4" name="Slide Number Placeholder 3"/>
+          <p:cNvSpPr>
+            <a:spLocks noGrp="1"/>
+          </p:cNvSpPr>
+          <p:nvPr>
+            <p:ph type="sldNum" sz="quarter" idx="10"/>
+          </p:nvPr>
+        </p:nvSpPr>
+        <p:spPr/>
+        <p:txBody>
+          <a:bodyPr/>
+          <a:lstStyle/>
+          <a:p>
+            <a:pPr marL="0" marR="0" lvl="0" indent="0" algn="r" defTabSz="914400" rtl="0" eaLnBrk="1" fontAlgn="auto" latinLnBrk="0" hangingPunct="1">
+              <a:lnSpc>
+                <a:spcPct val="100000"/>
+              </a:lnSpc>
+              <a:spcBef>
+                <a:spcPts val="0"/>
+              </a:spcBef>
+              <a:spcAft>
+                <a:spcPts val="0"/>
+              </a:spcAft>
+              <a:buClrTx/>
+              <a:buSzTx/>
+              <a:buFontTx/>
+              <a:buNone/>
+              <a:tabLst/>
+              <a:defRPr/>
+            </a:pPr>
+            <a:fld id="{0EA2900F-B82C-4F11-85DB-97B88AAD310C}" type="slidenum">
+              <a:rPr kumimoji="0" lang="en-US" sz="1200" b="0" i="0" u="none" strike="noStrike" kern="1200" cap="none" spc="0" normalizeH="0" baseline="0" noProof="0" smtClean="0">
+                <a:ln>
+                  <a:noFill/>
+                </a:ln>
+                <a:solidFill>
+                  <a:prstClr val="black"/>
+                </a:solidFill>
+                <a:effectLst/>
+                <a:uLnTx/>
+                <a:uFillTx/>
+                <a:latin typeface="Calibri" panose="020F0502020204030204"/>
+                <a:ea typeface="+mn-ea"/>
+                <a:cs typeface="+mn-cs"/>
+              </a:rPr>
+              <a:pPr marL="0" marR="0" lvl="0" indent="0" algn="r" defTabSz="914400" rtl="0" eaLnBrk="1" fontAlgn="auto" latinLnBrk="0" hangingPunct="1">
+                <a:lnSpc>
+                  <a:spcPct val="100000"/>
+                </a:lnSpc>
+                <a:spcBef>
+                  <a:spcPts val="0"/>
+                </a:spcBef>
+                <a:spcAft>
+                  <a:spcPts val="0"/>
+                </a:spcAft>
+                <a:buClrTx/>
+                <a:buSzTx/>
+                <a:buFontTx/>
+                <a:buNone/>
+                <a:tabLst/>
+                <a:defRPr/>
+              </a:pPr>
+              <a:t>18</a:t>
+            </a:fld>
+            <a:endParaRPr kumimoji="0" lang="en-US" sz="1200" b="0" i="0" u="none" strike="noStrike" kern="1200" cap="none" spc="0" normalizeH="0" baseline="0" noProof="0">
+              <a:ln>
+                <a:noFill/>
+              </a:ln>
+              <a:solidFill>
+                <a:prstClr val="black"/>
+              </a:solidFill>
+              <a:effectLst/>
+              <a:uLnTx/>
+              <a:uFillTx/>
+              <a:latin typeface="Calibri" panose="020F0502020204030204"/>
+              <a:ea typeface="+mn-ea"/>
+              <a:cs typeface="+mn-cs"/>
+            </a:endParaRPr>
+          </a:p>
+        </p:txBody>
+      </p:sp>
+    </p:spTree>
+    <p:extLst>
+      <p:ext uri="{BB962C8B-B14F-4D97-AF65-F5344CB8AC3E}">
         <p14:creationId xmlns:p14="http://schemas.microsoft.com/office/powerpoint/2010/main" val="741705162"/>
       </p:ext>
     </p:extLst>
@@ -1877,7 +1879,7 @@
                 <a:tabLst/>
                 <a:defRPr/>
               </a:pPr>
-              <a:t>19</a:t>
+              <a:t>21</a:t>
             </a:fld>
             <a:endParaRPr kumimoji="0" lang="en-US" sz="1200" b="0" i="0" u="none" strike="noStrike" kern="1200" cap="none" spc="0" normalizeH="0" baseline="0" noProof="0">
               <a:ln>
@@ -2100,7 +2102,7 @@
             <a:fld id="{B4008EB6-D09E-4580-8CD6-DDB14511944F}" type="slidenum">
               <a:rPr lang="en-US" smtClean="0"/>
               <a:pPr/>
-              <a:t>20</a:t>
+              <a:t>22</a:t>
             </a:fld>
             <a:endParaRPr lang="en-US" dirty="0"/>
           </a:p>
@@ -2284,7 +2286,7 @@
             <a:fld id="{B4008EB6-D09E-4580-8CD6-DDB14511944F}" type="slidenum">
               <a:rPr lang="en-US" smtClean="0"/>
               <a:pPr/>
-              <a:t>21</a:t>
+              <a:t>23</a:t>
             </a:fld>
             <a:endParaRPr lang="en-US" dirty="0"/>
           </a:p>
@@ -20164,6 +20166,117 @@
       </p:grpSpPr>
       <p:sp>
         <p:nvSpPr>
+          <p:cNvPr id="2" name="Title 1"/>
+          <p:cNvSpPr>
+            <a:spLocks noGrp="1"/>
+          </p:cNvSpPr>
+          <p:nvPr>
+            <p:ph type="title"/>
+          </p:nvPr>
+        </p:nvSpPr>
+        <p:spPr>
+          <a:xfrm>
+            <a:off x="274639" y="295274"/>
+            <a:ext cx="4419598" cy="917575"/>
+          </a:xfrm>
+        </p:spPr>
+        <p:txBody>
+          <a:bodyPr/>
+          <a:lstStyle/>
+          <a:p>
+            <a:r>
+              <a:rPr lang="en-US" dirty="0"/>
+              <a:t>Breakout</a:t>
+            </a:r>
+          </a:p>
+        </p:txBody>
+      </p:sp>
+      <p:sp>
+        <p:nvSpPr>
+          <p:cNvPr id="3" name="Text Placeholder 2"/>
+          <p:cNvSpPr>
+            <a:spLocks noGrp="1"/>
+          </p:cNvSpPr>
+          <p:nvPr>
+            <p:ph type="body" sz="quarter" idx="10"/>
+          </p:nvPr>
+        </p:nvSpPr>
+        <p:spPr>
+          <a:xfrm>
+            <a:off x="274639" y="1287462"/>
+            <a:ext cx="4952999" cy="627864"/>
+          </a:xfrm>
+        </p:spPr>
+        <p:txBody>
+          <a:bodyPr/>
+          <a:lstStyle/>
+          <a:p>
+            <a:r>
+              <a:rPr lang="en-US" sz="3200" dirty="0"/>
+              <a:t>   </a:t>
+            </a:r>
+          </a:p>
+        </p:txBody>
+      </p:sp>
+      <p:pic>
+        <p:nvPicPr>
+          <p:cNvPr id="4" name="Picture 3"/>
+          <p:cNvPicPr>
+            <a:picLocks noChangeAspect="1"/>
+          </p:cNvPicPr>
+          <p:nvPr/>
+        </p:nvPicPr>
+        <p:blipFill>
+          <a:blip r:embed="rId2"/>
+          <a:stretch>
+            <a:fillRect/>
+          </a:stretch>
+        </p:blipFill>
+        <p:spPr>
+          <a:xfrm>
+            <a:off x="2103437" y="1058862"/>
+            <a:ext cx="8001000" cy="5664708"/>
+          </a:xfrm>
+          <a:prstGeom prst="rect">
+            <a:avLst/>
+          </a:prstGeom>
+        </p:spPr>
+      </p:pic>
+    </p:spTree>
+    <p:extLst>
+      <p:ext uri="{BB962C8B-B14F-4D97-AF65-F5344CB8AC3E}">
+        <p14:creationId xmlns:p14="http://schemas.microsoft.com/office/powerpoint/2010/main" val="4128996067"/>
+      </p:ext>
+    </p:extLst>
+  </p:cSld>
+  <p:clrMapOvr>
+    <a:masterClrMapping/>
+  </p:clrMapOvr>
+  <p:transition>
+    <p:fade/>
+  </p:transition>
+</p:sld>
+</file>
+
+<file path=ppt/slides/slide13.xml><?xml version="1.0" encoding="utf-8"?>
+<p:sld xmlns:a="http://schemas.openxmlformats.org/drawingml/2006/main" xmlns:r="http://schemas.openxmlformats.org/officeDocument/2006/relationships" xmlns:p="http://schemas.openxmlformats.org/presentationml/2006/main">
+  <p:cSld>
+    <p:spTree>
+      <p:nvGrpSpPr>
+        <p:cNvPr id="1" name=""/>
+        <p:cNvGrpSpPr/>
+        <p:nvPr/>
+      </p:nvGrpSpPr>
+      <p:grpSpPr>
+        <a:xfrm>
+          <a:off x="0" y="0"/>
+          <a:ext cx="0" cy="0"/>
+          <a:chOff x="0" y="0"/>
+          <a:chExt cx="0" cy="0"/>
+        </a:xfrm>
+      </p:grpSpPr>
+      <p:sp>
+        <p:nvSpPr>
           <p:cNvPr id="71" name="Rectangle 70"/>
           <p:cNvSpPr/>
           <p:nvPr/>
@@ -20934,7 +21047,7 @@
 </p:sld>
 </file>
 
-<file path=ppt/slides/slide13.xml><?xml version="1.0" encoding="utf-8"?>
+<file path=ppt/slides/slide14.xml><?xml version="1.0" encoding="utf-8"?>
 <p:sld xmlns:a="http://schemas.openxmlformats.org/drawingml/2006/main" xmlns:r="http://schemas.openxmlformats.org/officeDocument/2006/relationships" xmlns:p="http://schemas.openxmlformats.org/presentationml/2006/main">
   <p:cSld>
     <p:spTree>
@@ -21074,7 +21187,7 @@
 </p:sld>
 </file>
 
-<file path=ppt/slides/slide14.xml><?xml version="1.0" encoding="utf-8"?>
+<file path=ppt/slides/slide15.xml><?xml version="1.0" encoding="utf-8"?>
 <p:sld xmlns:a="http://schemas.openxmlformats.org/drawingml/2006/main" xmlns:r="http://schemas.openxmlformats.org/officeDocument/2006/relationships" xmlns:p="http://schemas.openxmlformats.org/presentationml/2006/main">
   <p:cSld>
     <p:spTree>
@@ -21881,7 +21994,7 @@
 </p:sld>
 </file>
 
-<file path=ppt/slides/slide15.xml><?xml version="1.0" encoding="utf-8"?>
+<file path=ppt/slides/slide16.xml><?xml version="1.0" encoding="utf-8"?>
 <p:sld xmlns:a="http://schemas.openxmlformats.org/drawingml/2006/main" xmlns:r="http://schemas.openxmlformats.org/officeDocument/2006/relationships" xmlns:p="http://schemas.openxmlformats.org/presentationml/2006/main">
   <p:cSld>
     <p:spTree>
@@ -22688,7 +22801,7 @@
 </p:sld>
 </file>
 
-<file path=ppt/slides/slide16.xml><?xml version="1.0" encoding="utf-8"?>
+<file path=ppt/slides/slide17.xml><?xml version="1.0" encoding="utf-8"?>
 <p:sld xmlns:a="http://schemas.openxmlformats.org/drawingml/2006/main" xmlns:r="http://schemas.openxmlformats.org/officeDocument/2006/relationships" xmlns:p="http://schemas.openxmlformats.org/presentationml/2006/main">
   <p:cSld>
     <p:spTree>
@@ -23495,7 +23608,7 @@
 </p:sld>
 </file>
 
-<file path=ppt/slides/slide17.xml><?xml version="1.0" encoding="utf-8"?>
+<file path=ppt/slides/slide18.xml><?xml version="1.0" encoding="utf-8"?>
 <p:sld xmlns:a="http://schemas.openxmlformats.org/drawingml/2006/main" xmlns:r="http://schemas.openxmlformats.org/officeDocument/2006/relationships" xmlns:p="http://schemas.openxmlformats.org/presentationml/2006/main">
   <p:cSld>
     <p:spTree>
@@ -24292,7 +24405,7 @@
 </p:sld>
 </file>
 
-<file path=ppt/slides/slide18.xml><?xml version="1.0" encoding="utf-8"?>
+<file path=ppt/slides/slide19.xml><?xml version="1.0" encoding="utf-8"?>
 <p:sld xmlns:a="http://schemas.openxmlformats.org/drawingml/2006/main" xmlns:r="http://schemas.openxmlformats.org/officeDocument/2006/relationships" xmlns:p="http://schemas.openxmlformats.org/presentationml/2006/main">
   <p:cSld>
     <p:spTree>
@@ -24507,7 +24620,257 @@
 </p:sld>
 </file>
 
-<file path=ppt/slides/slide19.xml><?xml version="1.0" encoding="utf-8"?>
+<file path=ppt/slides/slide2.xml><?xml version="1.0" encoding="utf-8"?>
+<p:sld xmlns:a="http://schemas.openxmlformats.org/drawingml/2006/main" xmlns:r="http://schemas.openxmlformats.org/officeDocument/2006/relationships" xmlns:p="http://schemas.openxmlformats.org/presentationml/2006/main">
+  <p:cSld>
+    <p:spTree>
+      <p:nvGrpSpPr>
+        <p:cNvPr id="1" name=""/>
+        <p:cNvGrpSpPr/>
+        <p:nvPr/>
+      </p:nvGrpSpPr>
+      <p:grpSpPr>
+        <a:xfrm>
+          <a:off x="0" y="0"/>
+          <a:ext cx="0" cy="0"/>
+          <a:chOff x="0" y="0"/>
+          <a:chExt cx="0" cy="0"/>
+        </a:xfrm>
+      </p:grpSpPr>
+      <p:sp>
+        <p:nvSpPr>
+          <p:cNvPr id="4" name="Title 3"/>
+          <p:cNvSpPr>
+            <a:spLocks noGrp="1"/>
+          </p:cNvSpPr>
+          <p:nvPr>
+            <p:ph type="title"/>
+          </p:nvPr>
+        </p:nvSpPr>
+        <p:spPr/>
+        <p:txBody>
+          <a:bodyPr/>
+          <a:lstStyle/>
+          <a:p>
+            <a:r>
+              <a:rPr lang="en-US" b="1" dirty="0"/>
+              <a:t>Porting your OpenGL ES 2.0 Game to Windows 10 using ANGLE</a:t>
+            </a:r>
+          </a:p>
+        </p:txBody>
+      </p:sp>
+      <p:sp>
+        <p:nvSpPr>
+          <p:cNvPr id="5" name="Text Placeholder 4"/>
+          <p:cNvSpPr>
+            <a:spLocks noGrp="1"/>
+          </p:cNvSpPr>
+          <p:nvPr>
+            <p:ph type="body" sz="quarter" idx="12"/>
+          </p:nvPr>
+        </p:nvSpPr>
+        <p:spPr/>
+        <p:txBody>
+          <a:bodyPr/>
+          <a:lstStyle/>
+          <a:p>
+            <a:r>
+              <a:rPr lang="en-US" dirty="0"/>
+              <a:t>Dale Stammen</a:t>
+            </a:r>
+          </a:p>
+          <a:p>
+            <a:r>
+              <a:rPr lang="en-US" dirty="0"/>
+              <a:t>Senior Software Engineer</a:t>
+            </a:r>
+          </a:p>
+          <a:p>
+            <a:r>
+              <a:rPr lang="en-US" dirty="0"/>
+              <a:t>dalestam@microsoft.com</a:t>
+            </a:r>
+          </a:p>
+        </p:txBody>
+      </p:sp>
+      <p:sp>
+        <p:nvSpPr>
+          <p:cNvPr id="6" name="Text Placeholder 5"/>
+          <p:cNvSpPr>
+            <a:spLocks noGrp="1"/>
+          </p:cNvSpPr>
+          <p:nvPr>
+            <p:ph type="body" sz="quarter" idx="13"/>
+          </p:nvPr>
+        </p:nvSpPr>
+        <p:spPr>
+          <a:xfrm>
+            <a:off x="8504238" y="307621"/>
+            <a:ext cx="3656013" cy="572464"/>
+          </a:xfrm>
+        </p:spPr>
+        <p:txBody>
+          <a:bodyPr/>
+          <a:lstStyle/>
+          <a:p>
+            <a:r>
+              <a:rPr lang="en-US" b="1" dirty="0"/>
+              <a:t>L709</a:t>
+            </a:r>
+            <a:endParaRPr lang="en-US" dirty="0"/>
+          </a:p>
+        </p:txBody>
+      </p:sp>
+    </p:spTree>
+    <p:extLst>
+      <p:ext uri="{BB962C8B-B14F-4D97-AF65-F5344CB8AC3E}">
+        <p14:creationId xmlns:p14="http://schemas.microsoft.com/office/powerpoint/2010/main" val="2666902894"/>
+      </p:ext>
+    </p:extLst>
+  </p:cSld>
+  <p:clrMapOvr>
+    <a:masterClrMapping/>
+  </p:clrMapOvr>
+  <mc:AlternateContent xmlns:mc="http://schemas.openxmlformats.org/markup-compatibility/2006" xmlns:p14="http://schemas.microsoft.com/office/powerpoint/2010/main">
+    <mc:Choice Requires="p14">
+      <p:transition spd="med" p14:dur="700">
+        <p:fade/>
+      </p:transition>
+    </mc:Choice>
+    <mc:Fallback xmlns="">
+      <p:transition spd="med">
+        <p:fade/>
+      </p:transition>
+    </mc:Fallback>
+  </mc:AlternateContent>
+</p:sld>
+</file>
+
+<file path=ppt/slides/slide20.xml><?xml version="1.0" encoding="utf-8"?>
+<p:sld xmlns:a="http://schemas.openxmlformats.org/drawingml/2006/main" xmlns:r="http://schemas.openxmlformats.org/officeDocument/2006/relationships" xmlns:p="http://schemas.openxmlformats.org/presentationml/2006/main">
+  <p:cSld>
+    <p:spTree>
+      <p:nvGrpSpPr>
+        <p:cNvPr id="1" name=""/>
+        <p:cNvGrpSpPr/>
+        <p:nvPr/>
+      </p:nvGrpSpPr>
+      <p:grpSpPr>
+        <a:xfrm>
+          <a:off x="0" y="0"/>
+          <a:ext cx="0" cy="0"/>
+          <a:chOff x="0" y="0"/>
+          <a:chExt cx="0" cy="0"/>
+        </a:xfrm>
+      </p:grpSpPr>
+      <p:sp>
+        <p:nvSpPr>
+          <p:cNvPr id="5" name="Text Placeholder 4"/>
+          <p:cNvSpPr>
+            <a:spLocks noGrp="1"/>
+          </p:cNvSpPr>
+          <p:nvPr>
+            <p:ph type="body" sz="quarter" idx="10"/>
+          </p:nvPr>
+        </p:nvSpPr>
+        <p:spPr>
+          <a:xfrm>
+            <a:off x="274638" y="1212850"/>
+            <a:ext cx="11887200" cy="2468368"/>
+          </a:xfrm>
+        </p:spPr>
+        <p:txBody>
+          <a:bodyPr/>
+          <a:lstStyle/>
+          <a:p>
+            <a:pPr marL="0" indent="0">
+              <a:buNone/>
+            </a:pPr>
+            <a:endParaRPr lang="en-US" sz="2800" dirty="0"/>
+          </a:p>
+          <a:p>
+            <a:pPr marL="0" indent="0">
+              <a:buNone/>
+            </a:pPr>
+            <a:r>
+              <a:rPr lang="en-US" sz="2800" dirty="0">
+                <a:hlinkClick r:id="rId2"/>
+              </a:rPr>
+              <a:t>https://github.com/MSOpenTech/angle/issues</a:t>
+            </a:r>
+            <a:endParaRPr lang="en-US" sz="2800" dirty="0"/>
+          </a:p>
+          <a:p>
+            <a:pPr marL="0" indent="0">
+              <a:buNone/>
+            </a:pPr>
+            <a:endParaRPr lang="en-US" sz="2800" dirty="0"/>
+          </a:p>
+          <a:p>
+            <a:pPr marL="0" indent="0">
+              <a:buNone/>
+            </a:pPr>
+            <a:r>
+              <a:rPr lang="en-US" sz="2800" dirty="0"/>
+              <a:t>Be prepared to provide a code sample of the issue.</a:t>
+            </a:r>
+          </a:p>
+          <a:p>
+            <a:pPr marL="0" indent="0">
+              <a:buNone/>
+            </a:pPr>
+            <a:endParaRPr lang="en-US" sz="2800" dirty="0"/>
+          </a:p>
+        </p:txBody>
+      </p:sp>
+      <p:sp>
+        <p:nvSpPr>
+          <p:cNvPr id="2" name="Title 1"/>
+          <p:cNvSpPr>
+            <a:spLocks noGrp="1"/>
+          </p:cNvSpPr>
+          <p:nvPr>
+            <p:ph type="title"/>
+          </p:nvPr>
+        </p:nvSpPr>
+        <p:spPr/>
+        <p:txBody>
+          <a:bodyPr/>
+          <a:lstStyle/>
+          <a:p>
+            <a:r>
+              <a:rPr lang="en-US" dirty="0"/>
+              <a:t>Issues</a:t>
+            </a:r>
+          </a:p>
+        </p:txBody>
+      </p:sp>
+    </p:spTree>
+    <p:extLst>
+      <p:ext uri="{BB962C8B-B14F-4D97-AF65-F5344CB8AC3E}">
+        <p14:creationId xmlns:p14="http://schemas.microsoft.com/office/powerpoint/2010/main" val="2704901849"/>
+      </p:ext>
+    </p:extLst>
+  </p:cSld>
+  <p:clrMapOvr>
+    <a:masterClrMapping/>
+  </p:clrMapOvr>
+  <mc:AlternateContent xmlns:mc="http://schemas.openxmlformats.org/markup-compatibility/2006" xmlns:p14="http://schemas.microsoft.com/office/powerpoint/2010/main">
+    <mc:Choice Requires="p14">
+      <p:transition spd="med" p14:dur="700">
+        <p:fade/>
+      </p:transition>
+    </mc:Choice>
+    <mc:Fallback xmlns="">
+      <p:transition spd="med">
+        <p:fade/>
+      </p:transition>
+    </mc:Fallback>
+  </mc:AlternateContent>
+</p:sld>
+</file>
+
+<file path=ppt/slides/slide21.xml><?xml version="1.0" encoding="utf-8"?>
 <p:sld xmlns:a="http://schemas.openxmlformats.org/drawingml/2006/main" xmlns:r="http://schemas.openxmlformats.org/officeDocument/2006/relationships" xmlns:p="http://schemas.openxmlformats.org/presentationml/2006/main">
   <p:cSld>
     <p:spTree>
@@ -25811,133 +26174,7 @@
 </p:sld>
 </file>
 
-<file path=ppt/slides/slide2.xml><?xml version="1.0" encoding="utf-8"?>
-<p:sld xmlns:a="http://schemas.openxmlformats.org/drawingml/2006/main" xmlns:r="http://schemas.openxmlformats.org/officeDocument/2006/relationships" xmlns:p="http://schemas.openxmlformats.org/presentationml/2006/main">
-  <p:cSld>
-    <p:spTree>
-      <p:nvGrpSpPr>
-        <p:cNvPr id="1" name=""/>
-        <p:cNvGrpSpPr/>
-        <p:nvPr/>
-      </p:nvGrpSpPr>
-      <p:grpSpPr>
-        <a:xfrm>
-          <a:off x="0" y="0"/>
-          <a:ext cx="0" cy="0"/>
-          <a:chOff x="0" y="0"/>
-          <a:chExt cx="0" cy="0"/>
-        </a:xfrm>
-      </p:grpSpPr>
-      <p:sp>
-        <p:nvSpPr>
-          <p:cNvPr id="4" name="Title 3"/>
-          <p:cNvSpPr>
-            <a:spLocks noGrp="1"/>
-          </p:cNvSpPr>
-          <p:nvPr>
-            <p:ph type="title"/>
-          </p:nvPr>
-        </p:nvSpPr>
-        <p:spPr/>
-        <p:txBody>
-          <a:bodyPr/>
-          <a:lstStyle/>
-          <a:p>
-            <a:r>
-              <a:rPr lang="en-US" b="1" dirty="0"/>
-              <a:t>Porting your OpenGL ES 2.0 Game to Windows 10 using ANGLE</a:t>
-            </a:r>
-          </a:p>
-        </p:txBody>
-      </p:sp>
-      <p:sp>
-        <p:nvSpPr>
-          <p:cNvPr id="5" name="Text Placeholder 4"/>
-          <p:cNvSpPr>
-            <a:spLocks noGrp="1"/>
-          </p:cNvSpPr>
-          <p:nvPr>
-            <p:ph type="body" sz="quarter" idx="12"/>
-          </p:nvPr>
-        </p:nvSpPr>
-        <p:spPr/>
-        <p:txBody>
-          <a:bodyPr/>
-          <a:lstStyle/>
-          <a:p>
-            <a:r>
-              <a:rPr lang="en-US" dirty="0"/>
-              <a:t>Dale Stammen</a:t>
-            </a:r>
-          </a:p>
-          <a:p>
-            <a:r>
-              <a:rPr lang="en-US" dirty="0"/>
-              <a:t>Senior Software Engineer</a:t>
-            </a:r>
-          </a:p>
-          <a:p>
-            <a:r>
-              <a:rPr lang="en-US" dirty="0"/>
-              <a:t>dalestam@microsoft.com</a:t>
-            </a:r>
-          </a:p>
-        </p:txBody>
-      </p:sp>
-      <p:sp>
-        <p:nvSpPr>
-          <p:cNvPr id="6" name="Text Placeholder 5"/>
-          <p:cNvSpPr>
-            <a:spLocks noGrp="1"/>
-          </p:cNvSpPr>
-          <p:nvPr>
-            <p:ph type="body" sz="quarter" idx="13"/>
-          </p:nvPr>
-        </p:nvSpPr>
-        <p:spPr>
-          <a:xfrm>
-            <a:off x="8504238" y="307621"/>
-            <a:ext cx="3656013" cy="572464"/>
-          </a:xfrm>
-        </p:spPr>
-        <p:txBody>
-          <a:bodyPr/>
-          <a:lstStyle/>
-          <a:p>
-            <a:r>
-              <a:rPr lang="en-US" b="1" dirty="0"/>
-              <a:t>L709</a:t>
-            </a:r>
-            <a:endParaRPr lang="en-US" dirty="0"/>
-          </a:p>
-        </p:txBody>
-      </p:sp>
-    </p:spTree>
-    <p:extLst>
-      <p:ext uri="{BB962C8B-B14F-4D97-AF65-F5344CB8AC3E}">
-        <p14:creationId xmlns:p14="http://schemas.microsoft.com/office/powerpoint/2010/main" val="2666902894"/>
-      </p:ext>
-    </p:extLst>
-  </p:cSld>
-  <p:clrMapOvr>
-    <a:masterClrMapping/>
-  </p:clrMapOvr>
-  <mc:AlternateContent xmlns:mc="http://schemas.openxmlformats.org/markup-compatibility/2006" xmlns:p14="http://schemas.microsoft.com/office/powerpoint/2010/main">
-    <mc:Choice Requires="p14">
-      <p:transition spd="med" p14:dur="700">
-        <p:fade/>
-      </p:transition>
-    </mc:Choice>
-    <mc:Fallback xmlns="">
-      <p:transition spd="med">
-        <p:fade/>
-      </p:transition>
-    </mc:Fallback>
-  </mc:AlternateContent>
-</p:sld>
-</file>
-
-<file path=ppt/slides/slide20.xml><?xml version="1.0" encoding="utf-8"?>
+<file path=ppt/slides/slide22.xml><?xml version="1.0" encoding="utf-8"?>
 <p:sld xmlns:a="http://schemas.openxmlformats.org/drawingml/2006/main" xmlns:r="http://schemas.openxmlformats.org/officeDocument/2006/relationships" xmlns:p="http://schemas.openxmlformats.org/presentationml/2006/main">
   <p:cSld>
     <p:spTree>
@@ -26026,7 +26263,7 @@
 </p:sld>
 </file>
 
-<file path=ppt/slides/slide21.xml><?xml version="1.0" encoding="utf-8"?>
+<file path=ppt/slides/slide23.xml><?xml version="1.0" encoding="utf-8"?>
 <p:sld xmlns:a="http://schemas.openxmlformats.org/drawingml/2006/main" xmlns:r="http://schemas.openxmlformats.org/officeDocument/2006/relationships" xmlns:p="http://schemas.openxmlformats.org/presentationml/2006/main">
   <p:cSld>
     <p:spTree>

</xml_diff>